<commit_message>
ppt review and modification
</commit_message>
<xml_diff>
--- a/courseMaterial/Objective-7-Using Methods/Methods.pptx
+++ b/courseMaterial/Objective-7-Using Methods/Methods.pptx
@@ -5,10 +5,10 @@
     <p:sldMasterId id="2147483648" r:id="rId4"/>
   </p:sldMasterIdLst>
   <p:notesMasterIdLst>
-    <p:notesMasterId r:id="rId21"/>
+    <p:notesMasterId r:id="rId20"/>
   </p:notesMasterIdLst>
   <p:handoutMasterIdLst>
-    <p:handoutMasterId r:id="rId22"/>
+    <p:handoutMasterId r:id="rId21"/>
   </p:handoutMasterIdLst>
   <p:sldIdLst>
     <p:sldId id="256" r:id="rId5"/>
@@ -22,11 +22,10 @@
     <p:sldId id="287" r:id="rId13"/>
     <p:sldId id="288" r:id="rId14"/>
     <p:sldId id="289" r:id="rId15"/>
-    <p:sldId id="290" r:id="rId16"/>
-    <p:sldId id="291" r:id="rId17"/>
-    <p:sldId id="293" r:id="rId18"/>
-    <p:sldId id="292" r:id="rId19"/>
-    <p:sldId id="268" r:id="rId20"/>
+    <p:sldId id="291" r:id="rId16"/>
+    <p:sldId id="293" r:id="rId17"/>
+    <p:sldId id="292" r:id="rId18"/>
+    <p:sldId id="268" r:id="rId19"/>
   </p:sldIdLst>
   <p:sldSz cx="12192000" cy="6858000"/>
   <p:notesSz cx="6858000" cy="9144000"/>
@@ -127,10 +126,10 @@
   </p:defaultTextStyle>
   <p:extLst>
     <p:ext uri="{EFAFB233-063F-42B5-8137-9DF3F51BA10A}">
-      <p15:sldGuideLst xmlns:p15="http://schemas.microsoft.com/office/powerpoint/2012/main"/>
+      <p15:sldGuideLst xmlns:p15="http://schemas.microsoft.com/office/powerpoint/2012/main" xmlns=""/>
     </p:ext>
     <p:ext uri="{2D200454-40CA-4A62-9FC3-DE9A4176ACB9}">
-      <p15:notesGuideLst xmlns:p15="http://schemas.microsoft.com/office/powerpoint/2012/main"/>
+      <p15:notesGuideLst xmlns:p15="http://schemas.microsoft.com/office/powerpoint/2012/main" xmlns=""/>
     </p:ext>
   </p:extLst>
 </p:presentation>
@@ -163,7 +162,7 @@
           <p:cNvPr id="2" name="Header Placeholder 1">
             <a:extLst>
               <a:ext uri="{FF2B5EF4-FFF2-40B4-BE49-F238E27FC236}">
-                <a16:creationId xmlns:a16="http://schemas.microsoft.com/office/drawing/2014/main" id="{2BC10188-DC2C-458D-AB41-143A0BE9A310}"/>
+                <a16:creationId xmlns:a16="http://schemas.microsoft.com/office/drawing/2014/main" xmlns="" id="{2BC10188-DC2C-458D-AB41-143A0BE9A310}"/>
               </a:ext>
             </a:extLst>
           </p:cNvPr>
@@ -200,7 +199,7 @@
           <p:cNvPr id="3" name="Date Placeholder 2">
             <a:extLst>
               <a:ext uri="{FF2B5EF4-FFF2-40B4-BE49-F238E27FC236}">
-                <a16:creationId xmlns:a16="http://schemas.microsoft.com/office/drawing/2014/main" id="{C9634E15-7196-43FC-B912-C4D8B4A2CE79}"/>
+                <a16:creationId xmlns:a16="http://schemas.microsoft.com/office/drawing/2014/main" xmlns="" id="{C9634E15-7196-43FC-B912-C4D8B4A2CE79}"/>
               </a:ext>
             </a:extLst>
           </p:cNvPr>
@@ -230,7 +229,8 @@
           <a:p>
             <a:fld id="{68416927-5E9C-4E77-85FE-EE4C81C1DE39}" type="datetimeFigureOut">
               <a:rPr lang="en-US" smtClean="0"/>
-              <a:t>4/18/2020</a:t>
+              <a:pPr/>
+              <a:t>4/22/2020</a:t>
             </a:fld>
             <a:endParaRPr lang="en-US" dirty="0"/>
           </a:p>
@@ -241,7 +241,7 @@
           <p:cNvPr id="4" name="Footer Placeholder 3">
             <a:extLst>
               <a:ext uri="{FF2B5EF4-FFF2-40B4-BE49-F238E27FC236}">
-                <a16:creationId xmlns:a16="http://schemas.microsoft.com/office/drawing/2014/main" id="{89EA2570-D5B6-41CB-96C2-FFC9944668E5}"/>
+                <a16:creationId xmlns:a16="http://schemas.microsoft.com/office/drawing/2014/main" xmlns="" id="{89EA2570-D5B6-41CB-96C2-FFC9944668E5}"/>
               </a:ext>
             </a:extLst>
           </p:cNvPr>
@@ -278,7 +278,7 @@
           <p:cNvPr id="5" name="Slide Number Placeholder 4">
             <a:extLst>
               <a:ext uri="{FF2B5EF4-FFF2-40B4-BE49-F238E27FC236}">
-                <a16:creationId xmlns:a16="http://schemas.microsoft.com/office/drawing/2014/main" id="{15C31B37-7A69-4C30-9B63-29F8242FC246}"/>
+                <a16:creationId xmlns:a16="http://schemas.microsoft.com/office/drawing/2014/main" xmlns="" id="{15C31B37-7A69-4C30-9B63-29F8242FC246}"/>
               </a:ext>
             </a:extLst>
           </p:cNvPr>
@@ -308,6 +308,7 @@
           <a:p>
             <a:fld id="{D389B6C8-888A-401B-9F9B-D41D36B6C3E9}" type="slidenum">
               <a:rPr lang="en-US" smtClean="0"/>
+              <a:pPr/>
               <a:t>‹#›</a:t>
             </a:fld>
             <a:endParaRPr lang="en-US" dirty="0"/>
@@ -317,7 +318,7 @@
     </p:spTree>
     <p:extLst>
       <p:ext uri="{BB962C8B-B14F-4D97-AF65-F5344CB8AC3E}">
-        <p14:creationId xmlns:p14="http://schemas.microsoft.com/office/powerpoint/2010/main" val="2413100067"/>
+        <p14:creationId xmlns:p14="http://schemas.microsoft.com/office/powerpoint/2010/main" xmlns="" val="2413100067"/>
       </p:ext>
     </p:extLst>
   </p:cSld>
@@ -407,7 +408,8 @@
           <a:p>
             <a:fld id="{FA798B7E-6604-4F74-86DB-B30627D56244}" type="datetimeFigureOut">
               <a:rPr lang="en-US" smtClean="0"/>
-              <a:t>4/18/2020</a:t>
+              <a:pPr/>
+              <a:t>4/22/2020</a:t>
             </a:fld>
             <a:endParaRPr lang="en-US" dirty="0"/>
           </a:p>
@@ -565,6 +567,7 @@
           <a:p>
             <a:fld id="{D3F28A1F-3E69-47E5-AE93-E7F2155A242D}" type="slidenum">
               <a:rPr lang="en-US" smtClean="0"/>
+              <a:pPr/>
               <a:t>‹#›</a:t>
             </a:fld>
             <a:endParaRPr lang="en-US" dirty="0"/>
@@ -574,7 +577,7 @@
     </p:spTree>
     <p:extLst>
       <p:ext uri="{BB962C8B-B14F-4D97-AF65-F5344CB8AC3E}">
-        <p14:creationId xmlns:p14="http://schemas.microsoft.com/office/powerpoint/2010/main" val="2075933273"/>
+        <p14:creationId xmlns:p14="http://schemas.microsoft.com/office/powerpoint/2010/main" xmlns="" val="2075933273"/>
       </p:ext>
     </p:extLst>
   </p:cSld>
@@ -696,7 +699,7 @@
           <p:cNvPr id="2" name="Title 1">
             <a:extLst>
               <a:ext uri="{FF2B5EF4-FFF2-40B4-BE49-F238E27FC236}">
-                <a16:creationId xmlns:a16="http://schemas.microsoft.com/office/drawing/2014/main" id="{E5798B13-3B32-4354-B2B5-3165F2F6E65F}"/>
+                <a16:creationId xmlns:a16="http://schemas.microsoft.com/office/drawing/2014/main" xmlns="" id="{E5798B13-3B32-4354-B2B5-3165F2F6E65F}"/>
               </a:ext>
             </a:extLst>
           </p:cNvPr>
@@ -739,7 +742,7 @@
           <p:cNvPr id="4" name="Text Placeholder 3">
             <a:extLst>
               <a:ext uri="{FF2B5EF4-FFF2-40B4-BE49-F238E27FC236}">
-                <a16:creationId xmlns:a16="http://schemas.microsoft.com/office/drawing/2014/main" id="{16BB88CF-DF4F-4857-8602-72BCF5DDCDA1}"/>
+                <a16:creationId xmlns:a16="http://schemas.microsoft.com/office/drawing/2014/main" xmlns="" id="{16BB88CF-DF4F-4857-8602-72BCF5DDCDA1}"/>
               </a:ext>
             </a:extLst>
           </p:cNvPr>
@@ -810,7 +813,7 @@
           <p:cNvPr id="12" name="Straight Connector 11">
             <a:extLst>
               <a:ext uri="{FF2B5EF4-FFF2-40B4-BE49-F238E27FC236}">
-                <a16:creationId xmlns:a16="http://schemas.microsoft.com/office/drawing/2014/main" id="{A7EEBB7C-1679-4665-8688-1FA973E73DC1}"/>
+                <a16:creationId xmlns:a16="http://schemas.microsoft.com/office/drawing/2014/main" xmlns="" id="{A7EEBB7C-1679-4665-8688-1FA973E73DC1}"/>
               </a:ext>
             </a:extLst>
           </p:cNvPr>
@@ -862,7 +865,7 @@
           <p:cNvPr id="7" name="Rectangle 6">
             <a:extLst>
               <a:ext uri="{FF2B5EF4-FFF2-40B4-BE49-F238E27FC236}">
-                <a16:creationId xmlns:a16="http://schemas.microsoft.com/office/drawing/2014/main" id="{F1E3214F-3A93-4A1C-920D-D86BE35A58FB}"/>
+                <a16:creationId xmlns:a16="http://schemas.microsoft.com/office/drawing/2014/main" xmlns="" id="{F1E3214F-3A93-4A1C-920D-D86BE35A58FB}"/>
               </a:ext>
             </a:extLst>
           </p:cNvPr>
@@ -917,7 +920,7 @@
           <p:cNvPr id="3" name="Slide Number Placeholder 2">
             <a:extLst>
               <a:ext uri="{FF2B5EF4-FFF2-40B4-BE49-F238E27FC236}">
-                <a16:creationId xmlns:a16="http://schemas.microsoft.com/office/drawing/2014/main" id="{213E97E5-C83B-444A-8C07-35D699E7C342}"/>
+                <a16:creationId xmlns:a16="http://schemas.microsoft.com/office/drawing/2014/main" xmlns="" id="{213E97E5-C83B-444A-8C07-35D699E7C342}"/>
               </a:ext>
             </a:extLst>
           </p:cNvPr>
@@ -949,7 +952,7 @@
     </p:spTree>
     <p:extLst>
       <p:ext uri="{BB962C8B-B14F-4D97-AF65-F5344CB8AC3E}">
-        <p14:creationId xmlns:p14="http://schemas.microsoft.com/office/powerpoint/2010/main" val="2226532245"/>
+        <p14:creationId xmlns:p14="http://schemas.microsoft.com/office/powerpoint/2010/main" xmlns="" val="2226532245"/>
       </p:ext>
     </p:extLst>
   </p:cSld>
@@ -981,7 +984,7 @@
           <p:cNvPr id="2" name="Title 1">
             <a:extLst>
               <a:ext uri="{FF2B5EF4-FFF2-40B4-BE49-F238E27FC236}">
-                <a16:creationId xmlns:a16="http://schemas.microsoft.com/office/drawing/2014/main" id="{0D1AB651-5612-4E6A-9B35-A555D082EC2F}"/>
+                <a16:creationId xmlns:a16="http://schemas.microsoft.com/office/drawing/2014/main" xmlns="" id="{0D1AB651-5612-4E6A-9B35-A555D082EC2F}"/>
               </a:ext>
             </a:extLst>
           </p:cNvPr>
@@ -1010,7 +1013,7 @@
           <p:cNvPr id="3" name="Content Placeholder 2">
             <a:extLst>
               <a:ext uri="{FF2B5EF4-FFF2-40B4-BE49-F238E27FC236}">
-                <a16:creationId xmlns:a16="http://schemas.microsoft.com/office/drawing/2014/main" id="{881389A2-D77B-40CA-AD1E-0178AEFAD15A}"/>
+                <a16:creationId xmlns:a16="http://schemas.microsoft.com/office/drawing/2014/main" xmlns="" id="{881389A2-D77B-40CA-AD1E-0178AEFAD15A}"/>
               </a:ext>
             </a:extLst>
           </p:cNvPr>
@@ -1091,7 +1094,7 @@
           <p:cNvPr id="4" name="Content Placeholder 3">
             <a:extLst>
               <a:ext uri="{FF2B5EF4-FFF2-40B4-BE49-F238E27FC236}">
-                <a16:creationId xmlns:a16="http://schemas.microsoft.com/office/drawing/2014/main" id="{A1DCA993-CBEA-48C5-BD35-50ABDFF64065}"/>
+                <a16:creationId xmlns:a16="http://schemas.microsoft.com/office/drawing/2014/main" xmlns="" id="{A1DCA993-CBEA-48C5-BD35-50ABDFF64065}"/>
               </a:ext>
             </a:extLst>
           </p:cNvPr>
@@ -1172,7 +1175,7 @@
           <p:cNvPr id="5" name="Slide Number Placeholder 4">
             <a:extLst>
               <a:ext uri="{FF2B5EF4-FFF2-40B4-BE49-F238E27FC236}">
-                <a16:creationId xmlns:a16="http://schemas.microsoft.com/office/drawing/2014/main" id="{B88ED8E0-95EC-469F-9B7E-562FBDFDE6CC}"/>
+                <a16:creationId xmlns:a16="http://schemas.microsoft.com/office/drawing/2014/main" xmlns="" id="{B88ED8E0-95EC-469F-9B7E-562FBDFDE6CC}"/>
               </a:ext>
             </a:extLst>
           </p:cNvPr>
@@ -1204,7 +1207,7 @@
     </p:spTree>
     <p:extLst>
       <p:ext uri="{BB962C8B-B14F-4D97-AF65-F5344CB8AC3E}">
-        <p14:creationId xmlns:p14="http://schemas.microsoft.com/office/powerpoint/2010/main" val="646344805"/>
+        <p14:creationId xmlns:p14="http://schemas.microsoft.com/office/powerpoint/2010/main" xmlns="" val="646344805"/>
       </p:ext>
     </p:extLst>
   </p:cSld>
@@ -1236,7 +1239,7 @@
           <p:cNvPr id="2" name="Title 1">
             <a:extLst>
               <a:ext uri="{FF2B5EF4-FFF2-40B4-BE49-F238E27FC236}">
-                <a16:creationId xmlns:a16="http://schemas.microsoft.com/office/drawing/2014/main" id="{EF776F88-2A37-410D-A685-E455AF3D07B4}"/>
+                <a16:creationId xmlns:a16="http://schemas.microsoft.com/office/drawing/2014/main" xmlns="" id="{EF776F88-2A37-410D-A685-E455AF3D07B4}"/>
               </a:ext>
             </a:extLst>
           </p:cNvPr>
@@ -1270,7 +1273,7 @@
           <p:cNvPr id="3" name="Text Placeholder 2">
             <a:extLst>
               <a:ext uri="{FF2B5EF4-FFF2-40B4-BE49-F238E27FC236}">
-                <a16:creationId xmlns:a16="http://schemas.microsoft.com/office/drawing/2014/main" id="{6C764B46-B015-44F7-8DC0-AFB8D275E486}"/>
+                <a16:creationId xmlns:a16="http://schemas.microsoft.com/office/drawing/2014/main" xmlns="" id="{6C764B46-B015-44F7-8DC0-AFB8D275E486}"/>
               </a:ext>
             </a:extLst>
           </p:cNvPr>
@@ -1341,7 +1344,7 @@
           <p:cNvPr id="4" name="Content Placeholder 3">
             <a:extLst>
               <a:ext uri="{FF2B5EF4-FFF2-40B4-BE49-F238E27FC236}">
-                <a16:creationId xmlns:a16="http://schemas.microsoft.com/office/drawing/2014/main" id="{2D3C8232-2077-497A-9142-B787E2B03A73}"/>
+                <a16:creationId xmlns:a16="http://schemas.microsoft.com/office/drawing/2014/main" xmlns="" id="{2D3C8232-2077-497A-9142-B787E2B03A73}"/>
               </a:ext>
             </a:extLst>
           </p:cNvPr>
@@ -1422,7 +1425,7 @@
           <p:cNvPr id="5" name="Text Placeholder 4">
             <a:extLst>
               <a:ext uri="{FF2B5EF4-FFF2-40B4-BE49-F238E27FC236}">
-                <a16:creationId xmlns:a16="http://schemas.microsoft.com/office/drawing/2014/main" id="{AAF6077C-D913-4FD0-B6E0-6D70BEFD40E6}"/>
+                <a16:creationId xmlns:a16="http://schemas.microsoft.com/office/drawing/2014/main" xmlns="" id="{AAF6077C-D913-4FD0-B6E0-6D70BEFD40E6}"/>
               </a:ext>
             </a:extLst>
           </p:cNvPr>
@@ -1493,7 +1496,7 @@
           <p:cNvPr id="6" name="Content Placeholder 5">
             <a:extLst>
               <a:ext uri="{FF2B5EF4-FFF2-40B4-BE49-F238E27FC236}">
-                <a16:creationId xmlns:a16="http://schemas.microsoft.com/office/drawing/2014/main" id="{43905DBB-3AA9-4435-AC97-732293FDE7EF}"/>
+                <a16:creationId xmlns:a16="http://schemas.microsoft.com/office/drawing/2014/main" xmlns="" id="{43905DBB-3AA9-4435-AC97-732293FDE7EF}"/>
               </a:ext>
             </a:extLst>
           </p:cNvPr>
@@ -1574,7 +1577,7 @@
           <p:cNvPr id="7" name="Slide Number Placeholder 6">
             <a:extLst>
               <a:ext uri="{FF2B5EF4-FFF2-40B4-BE49-F238E27FC236}">
-                <a16:creationId xmlns:a16="http://schemas.microsoft.com/office/drawing/2014/main" id="{1954C901-FCAF-4DFB-A621-6A969641CA73}"/>
+                <a16:creationId xmlns:a16="http://schemas.microsoft.com/office/drawing/2014/main" xmlns="" id="{1954C901-FCAF-4DFB-A621-6A969641CA73}"/>
               </a:ext>
             </a:extLst>
           </p:cNvPr>
@@ -1606,7 +1609,7 @@
     </p:spTree>
     <p:extLst>
       <p:ext uri="{BB962C8B-B14F-4D97-AF65-F5344CB8AC3E}">
-        <p14:creationId xmlns:p14="http://schemas.microsoft.com/office/powerpoint/2010/main" val="2292145525"/>
+        <p14:creationId xmlns:p14="http://schemas.microsoft.com/office/powerpoint/2010/main" xmlns="" val="2292145525"/>
       </p:ext>
     </p:extLst>
   </p:cSld>
@@ -1638,7 +1641,7 @@
           <p:cNvPr id="2" name="Title 1">
             <a:extLst>
               <a:ext uri="{FF2B5EF4-FFF2-40B4-BE49-F238E27FC236}">
-                <a16:creationId xmlns:a16="http://schemas.microsoft.com/office/drawing/2014/main" id="{99AF2623-2255-4BBA-9577-B3A3FD2AE8E8}"/>
+                <a16:creationId xmlns:a16="http://schemas.microsoft.com/office/drawing/2014/main" xmlns="" id="{99AF2623-2255-4BBA-9577-B3A3FD2AE8E8}"/>
               </a:ext>
             </a:extLst>
           </p:cNvPr>
@@ -1667,7 +1670,7 @@
           <p:cNvPr id="3" name="Slide Number Placeholder 2">
             <a:extLst>
               <a:ext uri="{FF2B5EF4-FFF2-40B4-BE49-F238E27FC236}">
-                <a16:creationId xmlns:a16="http://schemas.microsoft.com/office/drawing/2014/main" id="{5259F0F0-5E7C-4FC9-8E90-6ADCD7A714B6}"/>
+                <a16:creationId xmlns:a16="http://schemas.microsoft.com/office/drawing/2014/main" xmlns="" id="{5259F0F0-5E7C-4FC9-8E90-6ADCD7A714B6}"/>
               </a:ext>
             </a:extLst>
           </p:cNvPr>
@@ -1699,7 +1702,7 @@
     </p:spTree>
     <p:extLst>
       <p:ext uri="{BB962C8B-B14F-4D97-AF65-F5344CB8AC3E}">
-        <p14:creationId xmlns:p14="http://schemas.microsoft.com/office/powerpoint/2010/main" val="3105532259"/>
+        <p14:creationId xmlns:p14="http://schemas.microsoft.com/office/powerpoint/2010/main" xmlns="" val="3105532259"/>
       </p:ext>
     </p:extLst>
   </p:cSld>
@@ -1731,7 +1734,7 @@
           <p:cNvPr id="2" name="Slide Number Placeholder 1">
             <a:extLst>
               <a:ext uri="{FF2B5EF4-FFF2-40B4-BE49-F238E27FC236}">
-                <a16:creationId xmlns:a16="http://schemas.microsoft.com/office/drawing/2014/main" id="{0A9D3FFB-BE14-4D90-A515-10EDD1BEE6F1}"/>
+                <a16:creationId xmlns:a16="http://schemas.microsoft.com/office/drawing/2014/main" xmlns="" id="{0A9D3FFB-BE14-4D90-A515-10EDD1BEE6F1}"/>
               </a:ext>
             </a:extLst>
           </p:cNvPr>
@@ -1763,7 +1766,7 @@
     </p:spTree>
     <p:extLst>
       <p:ext uri="{BB962C8B-B14F-4D97-AF65-F5344CB8AC3E}">
-        <p14:creationId xmlns:p14="http://schemas.microsoft.com/office/powerpoint/2010/main" val="3627673970"/>
+        <p14:creationId xmlns:p14="http://schemas.microsoft.com/office/powerpoint/2010/main" xmlns="" val="3627673970"/>
       </p:ext>
     </p:extLst>
   </p:cSld>
@@ -1795,7 +1798,7 @@
           <p:cNvPr id="2" name="Title 1">
             <a:extLst>
               <a:ext uri="{FF2B5EF4-FFF2-40B4-BE49-F238E27FC236}">
-                <a16:creationId xmlns:a16="http://schemas.microsoft.com/office/drawing/2014/main" id="{A2451E51-BE82-4B1B-9CB6-89C26464DBE2}"/>
+                <a16:creationId xmlns:a16="http://schemas.microsoft.com/office/drawing/2014/main" xmlns="" id="{A2451E51-BE82-4B1B-9CB6-89C26464DBE2}"/>
               </a:ext>
             </a:extLst>
           </p:cNvPr>
@@ -1833,7 +1836,7 @@
           <p:cNvPr id="3" name="Content Placeholder 2">
             <a:extLst>
               <a:ext uri="{FF2B5EF4-FFF2-40B4-BE49-F238E27FC236}">
-                <a16:creationId xmlns:a16="http://schemas.microsoft.com/office/drawing/2014/main" id="{04CCBF8C-3CF7-47E6-9AB0-15584178B449}"/>
+                <a16:creationId xmlns:a16="http://schemas.microsoft.com/office/drawing/2014/main" xmlns="" id="{04CCBF8C-3CF7-47E6-9AB0-15584178B449}"/>
               </a:ext>
             </a:extLst>
           </p:cNvPr>
@@ -1924,7 +1927,7 @@
           <p:cNvPr id="4" name="Text Placeholder 3">
             <a:extLst>
               <a:ext uri="{FF2B5EF4-FFF2-40B4-BE49-F238E27FC236}">
-                <a16:creationId xmlns:a16="http://schemas.microsoft.com/office/drawing/2014/main" id="{3D07DA3C-0298-45CF-AFC3-41031C0763E3}"/>
+                <a16:creationId xmlns:a16="http://schemas.microsoft.com/office/drawing/2014/main" xmlns="" id="{3D07DA3C-0298-45CF-AFC3-41031C0763E3}"/>
               </a:ext>
             </a:extLst>
           </p:cNvPr>
@@ -1995,7 +1998,7 @@
           <p:cNvPr id="5" name="Slide Number Placeholder 4">
             <a:extLst>
               <a:ext uri="{FF2B5EF4-FFF2-40B4-BE49-F238E27FC236}">
-                <a16:creationId xmlns:a16="http://schemas.microsoft.com/office/drawing/2014/main" id="{F7C4FF87-D01E-416B-9EF8-E107C4EDDC42}"/>
+                <a16:creationId xmlns:a16="http://schemas.microsoft.com/office/drawing/2014/main" xmlns="" id="{F7C4FF87-D01E-416B-9EF8-E107C4EDDC42}"/>
               </a:ext>
             </a:extLst>
           </p:cNvPr>
@@ -2027,7 +2030,7 @@
     </p:spTree>
     <p:extLst>
       <p:ext uri="{BB962C8B-B14F-4D97-AF65-F5344CB8AC3E}">
-        <p14:creationId xmlns:p14="http://schemas.microsoft.com/office/powerpoint/2010/main" val="398533459"/>
+        <p14:creationId xmlns:p14="http://schemas.microsoft.com/office/powerpoint/2010/main" xmlns="" val="398533459"/>
       </p:ext>
     </p:extLst>
   </p:cSld>
@@ -2059,7 +2062,7 @@
           <p:cNvPr id="2" name="Title 1">
             <a:extLst>
               <a:ext uri="{FF2B5EF4-FFF2-40B4-BE49-F238E27FC236}">
-                <a16:creationId xmlns:a16="http://schemas.microsoft.com/office/drawing/2014/main" id="{E5798B13-3B32-4354-B2B5-3165F2F6E65F}"/>
+                <a16:creationId xmlns:a16="http://schemas.microsoft.com/office/drawing/2014/main" xmlns="" id="{E5798B13-3B32-4354-B2B5-3165F2F6E65F}"/>
               </a:ext>
             </a:extLst>
           </p:cNvPr>
@@ -2102,7 +2105,7 @@
           <p:cNvPr id="4" name="Text Placeholder 3">
             <a:extLst>
               <a:ext uri="{FF2B5EF4-FFF2-40B4-BE49-F238E27FC236}">
-                <a16:creationId xmlns:a16="http://schemas.microsoft.com/office/drawing/2014/main" id="{16BB88CF-DF4F-4857-8602-72BCF5DDCDA1}"/>
+                <a16:creationId xmlns:a16="http://schemas.microsoft.com/office/drawing/2014/main" xmlns="" id="{16BB88CF-DF4F-4857-8602-72BCF5DDCDA1}"/>
               </a:ext>
             </a:extLst>
           </p:cNvPr>
@@ -2173,7 +2176,7 @@
           <p:cNvPr id="12" name="Straight Connector 11">
             <a:extLst>
               <a:ext uri="{FF2B5EF4-FFF2-40B4-BE49-F238E27FC236}">
-                <a16:creationId xmlns:a16="http://schemas.microsoft.com/office/drawing/2014/main" id="{A7EEBB7C-1679-4665-8688-1FA973E73DC1}"/>
+                <a16:creationId xmlns:a16="http://schemas.microsoft.com/office/drawing/2014/main" xmlns="" id="{A7EEBB7C-1679-4665-8688-1FA973E73DC1}"/>
               </a:ext>
             </a:extLst>
           </p:cNvPr>
@@ -2225,7 +2228,7 @@
           <p:cNvPr id="7" name="Rectangle 6">
             <a:extLst>
               <a:ext uri="{FF2B5EF4-FFF2-40B4-BE49-F238E27FC236}">
-                <a16:creationId xmlns:a16="http://schemas.microsoft.com/office/drawing/2014/main" id="{F1E3214F-3A93-4A1C-920D-D86BE35A58FB}"/>
+                <a16:creationId xmlns:a16="http://schemas.microsoft.com/office/drawing/2014/main" xmlns="" id="{F1E3214F-3A93-4A1C-920D-D86BE35A58FB}"/>
               </a:ext>
             </a:extLst>
           </p:cNvPr>
@@ -2280,7 +2283,7 @@
           <p:cNvPr id="3" name="Slide Number Placeholder 2">
             <a:extLst>
               <a:ext uri="{FF2B5EF4-FFF2-40B4-BE49-F238E27FC236}">
-                <a16:creationId xmlns:a16="http://schemas.microsoft.com/office/drawing/2014/main" id="{213E97E5-C83B-444A-8C07-35D699E7C342}"/>
+                <a16:creationId xmlns:a16="http://schemas.microsoft.com/office/drawing/2014/main" xmlns="" id="{213E97E5-C83B-444A-8C07-35D699E7C342}"/>
               </a:ext>
             </a:extLst>
           </p:cNvPr>
@@ -2314,7 +2317,7 @@
           <p:cNvPr id="8" name="Picture Placeholder 2">
             <a:extLst>
               <a:ext uri="{FF2B5EF4-FFF2-40B4-BE49-F238E27FC236}">
-                <a16:creationId xmlns:a16="http://schemas.microsoft.com/office/drawing/2014/main" id="{2641ECAC-0557-4843-8433-067E4414E2F5}"/>
+                <a16:creationId xmlns:a16="http://schemas.microsoft.com/office/drawing/2014/main" xmlns="" id="{2641ECAC-0557-4843-8433-067E4414E2F5}"/>
               </a:ext>
             </a:extLst>
           </p:cNvPr>
@@ -2390,7 +2393,7 @@
     </p:spTree>
     <p:extLst>
       <p:ext uri="{BB962C8B-B14F-4D97-AF65-F5344CB8AC3E}">
-        <p14:creationId xmlns:p14="http://schemas.microsoft.com/office/powerpoint/2010/main" val="3394383312"/>
+        <p14:creationId xmlns:p14="http://schemas.microsoft.com/office/powerpoint/2010/main" xmlns="" val="3394383312"/>
       </p:ext>
     </p:extLst>
   </p:cSld>
@@ -2433,7 +2436,7 @@
           <p:cNvPr id="2" name="Title 1">
             <a:extLst>
               <a:ext uri="{FF2B5EF4-FFF2-40B4-BE49-F238E27FC236}">
-                <a16:creationId xmlns:a16="http://schemas.microsoft.com/office/drawing/2014/main" id="{FE91AD08-4E28-4191-9B62-EAD61608E5CF}"/>
+                <a16:creationId xmlns:a16="http://schemas.microsoft.com/office/drawing/2014/main" xmlns="" id="{FE91AD08-4E28-4191-9B62-EAD61608E5CF}"/>
               </a:ext>
             </a:extLst>
           </p:cNvPr>
@@ -2481,7 +2484,7 @@
           <p:cNvPr id="3" name="Content Placeholder 2">
             <a:extLst>
               <a:ext uri="{FF2B5EF4-FFF2-40B4-BE49-F238E27FC236}">
-                <a16:creationId xmlns:a16="http://schemas.microsoft.com/office/drawing/2014/main" id="{90BF853D-76DB-46F3-AF6C-1E77C8E06AA9}"/>
+                <a16:creationId xmlns:a16="http://schemas.microsoft.com/office/drawing/2014/main" xmlns="" id="{90BF853D-76DB-46F3-AF6C-1E77C8E06AA9}"/>
               </a:ext>
             </a:extLst>
           </p:cNvPr>
@@ -2562,7 +2565,7 @@
           <p:cNvPr id="4" name="Slide Number Placeholder 3">
             <a:extLst>
               <a:ext uri="{FF2B5EF4-FFF2-40B4-BE49-F238E27FC236}">
-                <a16:creationId xmlns:a16="http://schemas.microsoft.com/office/drawing/2014/main" id="{0660D61A-B9FD-4DFF-AC42-4069DAFE238C}"/>
+                <a16:creationId xmlns:a16="http://schemas.microsoft.com/office/drawing/2014/main" xmlns="" id="{0660D61A-B9FD-4DFF-AC42-4069DAFE238C}"/>
               </a:ext>
             </a:extLst>
           </p:cNvPr>
@@ -2594,7 +2597,7 @@
     </p:spTree>
     <p:extLst>
       <p:ext uri="{BB962C8B-B14F-4D97-AF65-F5344CB8AC3E}">
-        <p14:creationId xmlns:p14="http://schemas.microsoft.com/office/powerpoint/2010/main" val="3839236654"/>
+        <p14:creationId xmlns:p14="http://schemas.microsoft.com/office/powerpoint/2010/main" xmlns="" val="3839236654"/>
       </p:ext>
     </p:extLst>
   </p:cSld>
@@ -2637,7 +2640,7 @@
           <p:cNvPr id="2" name="Title 1">
             <a:extLst>
               <a:ext uri="{FF2B5EF4-FFF2-40B4-BE49-F238E27FC236}">
-                <a16:creationId xmlns:a16="http://schemas.microsoft.com/office/drawing/2014/main" id="{FE91AD08-4E28-4191-9B62-EAD61608E5CF}"/>
+                <a16:creationId xmlns:a16="http://schemas.microsoft.com/office/drawing/2014/main" xmlns="" id="{FE91AD08-4E28-4191-9B62-EAD61608E5CF}"/>
               </a:ext>
             </a:extLst>
           </p:cNvPr>
@@ -2687,7 +2690,7 @@
           <p:cNvPr id="3" name="Content Placeholder 2">
             <a:extLst>
               <a:ext uri="{FF2B5EF4-FFF2-40B4-BE49-F238E27FC236}">
-                <a16:creationId xmlns:a16="http://schemas.microsoft.com/office/drawing/2014/main" id="{90BF853D-76DB-46F3-AF6C-1E77C8E06AA9}"/>
+                <a16:creationId xmlns:a16="http://schemas.microsoft.com/office/drawing/2014/main" xmlns="" id="{90BF853D-76DB-46F3-AF6C-1E77C8E06AA9}"/>
               </a:ext>
             </a:extLst>
           </p:cNvPr>
@@ -2768,7 +2771,7 @@
           <p:cNvPr id="4" name="Slide Number Placeholder 3">
             <a:extLst>
               <a:ext uri="{FF2B5EF4-FFF2-40B4-BE49-F238E27FC236}">
-                <a16:creationId xmlns:a16="http://schemas.microsoft.com/office/drawing/2014/main" id="{0660D61A-B9FD-4DFF-AC42-4069DAFE238C}"/>
+                <a16:creationId xmlns:a16="http://schemas.microsoft.com/office/drawing/2014/main" xmlns="" id="{0660D61A-B9FD-4DFF-AC42-4069DAFE238C}"/>
               </a:ext>
             </a:extLst>
           </p:cNvPr>
@@ -2800,7 +2803,7 @@
     </p:spTree>
     <p:extLst>
       <p:ext uri="{BB962C8B-B14F-4D97-AF65-F5344CB8AC3E}">
-        <p14:creationId xmlns:p14="http://schemas.microsoft.com/office/powerpoint/2010/main" val="1594571051"/>
+        <p14:creationId xmlns:p14="http://schemas.microsoft.com/office/powerpoint/2010/main" xmlns="" val="1594571051"/>
       </p:ext>
     </p:extLst>
   </p:cSld>
@@ -2832,7 +2835,7 @@
           <p:cNvPr id="7" name="Picture Placeholder 2">
             <a:extLst>
               <a:ext uri="{FF2B5EF4-FFF2-40B4-BE49-F238E27FC236}">
-                <a16:creationId xmlns:a16="http://schemas.microsoft.com/office/drawing/2014/main" id="{6D3C5ED2-B01D-4104-B193-BC78D76A4646}"/>
+                <a16:creationId xmlns:a16="http://schemas.microsoft.com/office/drawing/2014/main" xmlns="" id="{6D3C5ED2-B01D-4104-B193-BC78D76A4646}"/>
               </a:ext>
             </a:extLst>
           </p:cNvPr>
@@ -2905,7 +2908,7 @@
           <p:cNvPr id="2" name="Title 1">
             <a:extLst>
               <a:ext uri="{FF2B5EF4-FFF2-40B4-BE49-F238E27FC236}">
-                <a16:creationId xmlns:a16="http://schemas.microsoft.com/office/drawing/2014/main" id="{FE91AD08-4E28-4191-9B62-EAD61608E5CF}"/>
+                <a16:creationId xmlns:a16="http://schemas.microsoft.com/office/drawing/2014/main" xmlns="" id="{FE91AD08-4E28-4191-9B62-EAD61608E5CF}"/>
               </a:ext>
             </a:extLst>
           </p:cNvPr>
@@ -2952,7 +2955,7 @@
           <p:cNvPr id="3" name="Content Placeholder 2">
             <a:extLst>
               <a:ext uri="{FF2B5EF4-FFF2-40B4-BE49-F238E27FC236}">
-                <a16:creationId xmlns:a16="http://schemas.microsoft.com/office/drawing/2014/main" id="{90BF853D-76DB-46F3-AF6C-1E77C8E06AA9}"/>
+                <a16:creationId xmlns:a16="http://schemas.microsoft.com/office/drawing/2014/main" xmlns="" id="{90BF853D-76DB-46F3-AF6C-1E77C8E06AA9}"/>
               </a:ext>
             </a:extLst>
           </p:cNvPr>
@@ -3033,7 +3036,7 @@
           <p:cNvPr id="4" name="Slide Number Placeholder 3">
             <a:extLst>
               <a:ext uri="{FF2B5EF4-FFF2-40B4-BE49-F238E27FC236}">
-                <a16:creationId xmlns:a16="http://schemas.microsoft.com/office/drawing/2014/main" id="{0660D61A-B9FD-4DFF-AC42-4069DAFE238C}"/>
+                <a16:creationId xmlns:a16="http://schemas.microsoft.com/office/drawing/2014/main" xmlns="" id="{0660D61A-B9FD-4DFF-AC42-4069DAFE238C}"/>
               </a:ext>
             </a:extLst>
           </p:cNvPr>
@@ -3070,7 +3073,7 @@
     </p:spTree>
     <p:extLst>
       <p:ext uri="{BB962C8B-B14F-4D97-AF65-F5344CB8AC3E}">
-        <p14:creationId xmlns:p14="http://schemas.microsoft.com/office/powerpoint/2010/main" val="1797904098"/>
+        <p14:creationId xmlns:p14="http://schemas.microsoft.com/office/powerpoint/2010/main" xmlns="" val="1797904098"/>
       </p:ext>
     </p:extLst>
   </p:cSld>
@@ -3102,7 +3105,7 @@
           <p:cNvPr id="2" name="Title 1">
             <a:extLst>
               <a:ext uri="{FF2B5EF4-FFF2-40B4-BE49-F238E27FC236}">
-                <a16:creationId xmlns:a16="http://schemas.microsoft.com/office/drawing/2014/main" id="{FE91AD08-4E28-4191-9B62-EAD61608E5CF}"/>
+                <a16:creationId xmlns:a16="http://schemas.microsoft.com/office/drawing/2014/main" xmlns="" id="{FE91AD08-4E28-4191-9B62-EAD61608E5CF}"/>
               </a:ext>
             </a:extLst>
           </p:cNvPr>
@@ -3162,7 +3165,7 @@
           <p:cNvPr id="3" name="Content Placeholder 2">
             <a:extLst>
               <a:ext uri="{FF2B5EF4-FFF2-40B4-BE49-F238E27FC236}">
-                <a16:creationId xmlns:a16="http://schemas.microsoft.com/office/drawing/2014/main" id="{90BF853D-76DB-46F3-AF6C-1E77C8E06AA9}"/>
+                <a16:creationId xmlns:a16="http://schemas.microsoft.com/office/drawing/2014/main" xmlns="" id="{90BF853D-76DB-46F3-AF6C-1E77C8E06AA9}"/>
               </a:ext>
             </a:extLst>
           </p:cNvPr>
@@ -3243,7 +3246,7 @@
           <p:cNvPr id="14" name="Slide Number Placeholder 13">
             <a:extLst>
               <a:ext uri="{FF2B5EF4-FFF2-40B4-BE49-F238E27FC236}">
-                <a16:creationId xmlns:a16="http://schemas.microsoft.com/office/drawing/2014/main" id="{7746CAFB-2B99-470B-B55B-9BF378E3A04B}"/>
+                <a16:creationId xmlns:a16="http://schemas.microsoft.com/office/drawing/2014/main" xmlns="" id="{7746CAFB-2B99-470B-B55B-9BF378E3A04B}"/>
               </a:ext>
             </a:extLst>
           </p:cNvPr>
@@ -3275,7 +3278,7 @@
     </p:spTree>
     <p:extLst>
       <p:ext uri="{BB962C8B-B14F-4D97-AF65-F5344CB8AC3E}">
-        <p14:creationId xmlns:p14="http://schemas.microsoft.com/office/powerpoint/2010/main" val="1160496352"/>
+        <p14:creationId xmlns:p14="http://schemas.microsoft.com/office/powerpoint/2010/main" xmlns="" val="1160496352"/>
       </p:ext>
     </p:extLst>
   </p:cSld>
@@ -3307,7 +3310,7 @@
           <p:cNvPr id="17" name="Title 16">
             <a:extLst>
               <a:ext uri="{FF2B5EF4-FFF2-40B4-BE49-F238E27FC236}">
-                <a16:creationId xmlns:a16="http://schemas.microsoft.com/office/drawing/2014/main" id="{65237DA4-112F-40B2-8C8C-EB23506D9C45}"/>
+                <a16:creationId xmlns:a16="http://schemas.microsoft.com/office/drawing/2014/main" xmlns="" id="{65237DA4-112F-40B2-8C8C-EB23506D9C45}"/>
               </a:ext>
             </a:extLst>
           </p:cNvPr>
@@ -3366,7 +3369,7 @@
           <p:cNvPr id="3" name="Content Placeholder 2">
             <a:extLst>
               <a:ext uri="{FF2B5EF4-FFF2-40B4-BE49-F238E27FC236}">
-                <a16:creationId xmlns:a16="http://schemas.microsoft.com/office/drawing/2014/main" id="{90BF853D-76DB-46F3-AF6C-1E77C8E06AA9}"/>
+                <a16:creationId xmlns:a16="http://schemas.microsoft.com/office/drawing/2014/main" xmlns="" id="{90BF853D-76DB-46F3-AF6C-1E77C8E06AA9}"/>
               </a:ext>
             </a:extLst>
           </p:cNvPr>
@@ -3429,7 +3432,7 @@
           <p:cNvPr id="14" name="Slide Number Placeholder 13">
             <a:extLst>
               <a:ext uri="{FF2B5EF4-FFF2-40B4-BE49-F238E27FC236}">
-                <a16:creationId xmlns:a16="http://schemas.microsoft.com/office/drawing/2014/main" id="{7746CAFB-2B99-470B-B55B-9BF378E3A04B}"/>
+                <a16:creationId xmlns:a16="http://schemas.microsoft.com/office/drawing/2014/main" xmlns="" id="{7746CAFB-2B99-470B-B55B-9BF378E3A04B}"/>
               </a:ext>
             </a:extLst>
           </p:cNvPr>
@@ -3478,7 +3481,7 @@
     </p:spTree>
     <p:extLst>
       <p:ext uri="{BB962C8B-B14F-4D97-AF65-F5344CB8AC3E}">
-        <p14:creationId xmlns:p14="http://schemas.microsoft.com/office/powerpoint/2010/main" val="364498605"/>
+        <p14:creationId xmlns:p14="http://schemas.microsoft.com/office/powerpoint/2010/main" xmlns="" val="364498605"/>
       </p:ext>
     </p:extLst>
   </p:cSld>
@@ -3510,7 +3513,7 @@
           <p:cNvPr id="4" name="Slide Number Placeholder 3">
             <a:extLst>
               <a:ext uri="{FF2B5EF4-FFF2-40B4-BE49-F238E27FC236}">
-                <a16:creationId xmlns:a16="http://schemas.microsoft.com/office/drawing/2014/main" id="{0660D61A-B9FD-4DFF-AC42-4069DAFE238C}"/>
+                <a16:creationId xmlns:a16="http://schemas.microsoft.com/office/drawing/2014/main" xmlns="" id="{0660D61A-B9FD-4DFF-AC42-4069DAFE238C}"/>
               </a:ext>
             </a:extLst>
           </p:cNvPr>
@@ -3544,7 +3547,7 @@
           <p:cNvPr id="5" name="Content Placeholder 2">
             <a:extLst>
               <a:ext uri="{FF2B5EF4-FFF2-40B4-BE49-F238E27FC236}">
-                <a16:creationId xmlns:a16="http://schemas.microsoft.com/office/drawing/2014/main" id="{D68E6EF2-4B2F-4D0D-9505-CE92872972F7}"/>
+                <a16:creationId xmlns:a16="http://schemas.microsoft.com/office/drawing/2014/main" xmlns="" id="{D68E6EF2-4B2F-4D0D-9505-CE92872972F7}"/>
               </a:ext>
             </a:extLst>
           </p:cNvPr>
@@ -3607,7 +3610,7 @@
           <p:cNvPr id="6" name="Title 1">
             <a:extLst>
               <a:ext uri="{FF2B5EF4-FFF2-40B4-BE49-F238E27FC236}">
-                <a16:creationId xmlns:a16="http://schemas.microsoft.com/office/drawing/2014/main" id="{D91A21B9-BA54-413B-940E-027C32E4D429}"/>
+                <a16:creationId xmlns:a16="http://schemas.microsoft.com/office/drawing/2014/main" xmlns="" id="{D91A21B9-BA54-413B-940E-027C32E4D429}"/>
               </a:ext>
             </a:extLst>
           </p:cNvPr>
@@ -3653,7 +3656,7 @@
     </p:spTree>
     <p:extLst>
       <p:ext uri="{BB962C8B-B14F-4D97-AF65-F5344CB8AC3E}">
-        <p14:creationId xmlns:p14="http://schemas.microsoft.com/office/powerpoint/2010/main" val="3610051244"/>
+        <p14:creationId xmlns:p14="http://schemas.microsoft.com/office/powerpoint/2010/main" xmlns="" val="3610051244"/>
       </p:ext>
     </p:extLst>
   </p:cSld>
@@ -3685,7 +3688,7 @@
           <p:cNvPr id="2" name="Title 1">
             <a:extLst>
               <a:ext uri="{FF2B5EF4-FFF2-40B4-BE49-F238E27FC236}">
-                <a16:creationId xmlns:a16="http://schemas.microsoft.com/office/drawing/2014/main" id="{9722BDA7-8BE9-42D5-ACF1-0F51423A206E}"/>
+                <a16:creationId xmlns:a16="http://schemas.microsoft.com/office/drawing/2014/main" xmlns="" id="{9722BDA7-8BE9-42D5-ACF1-0F51423A206E}"/>
               </a:ext>
             </a:extLst>
           </p:cNvPr>
@@ -3723,7 +3726,7 @@
           <p:cNvPr id="3" name="Text Placeholder 2">
             <a:extLst>
               <a:ext uri="{FF2B5EF4-FFF2-40B4-BE49-F238E27FC236}">
-                <a16:creationId xmlns:a16="http://schemas.microsoft.com/office/drawing/2014/main" id="{71CEF73F-3CCA-4312-8E9C-2B4629DA1F66}"/>
+                <a16:creationId xmlns:a16="http://schemas.microsoft.com/office/drawing/2014/main" xmlns="" id="{71CEF73F-3CCA-4312-8E9C-2B4629DA1F66}"/>
               </a:ext>
             </a:extLst>
           </p:cNvPr>
@@ -3848,7 +3851,7 @@
           <p:cNvPr id="4" name="Slide Number Placeholder 3">
             <a:extLst>
               <a:ext uri="{FF2B5EF4-FFF2-40B4-BE49-F238E27FC236}">
-                <a16:creationId xmlns:a16="http://schemas.microsoft.com/office/drawing/2014/main" id="{293BF716-502C-4821-A3A0-19C2C508EED1}"/>
+                <a16:creationId xmlns:a16="http://schemas.microsoft.com/office/drawing/2014/main" xmlns="" id="{293BF716-502C-4821-A3A0-19C2C508EED1}"/>
               </a:ext>
             </a:extLst>
           </p:cNvPr>
@@ -3880,7 +3883,7 @@
     </p:spTree>
     <p:extLst>
       <p:ext uri="{BB962C8B-B14F-4D97-AF65-F5344CB8AC3E}">
-        <p14:creationId xmlns:p14="http://schemas.microsoft.com/office/powerpoint/2010/main" val="2665983131"/>
+        <p14:creationId xmlns:p14="http://schemas.microsoft.com/office/powerpoint/2010/main" xmlns="" val="2665983131"/>
       </p:ext>
     </p:extLst>
   </p:cSld>
@@ -3923,7 +3926,7 @@
           <p:cNvPr id="5" name="Picture 4">
             <a:extLst>
               <a:ext uri="{FF2B5EF4-FFF2-40B4-BE49-F238E27FC236}">
-                <a16:creationId xmlns:a16="http://schemas.microsoft.com/office/drawing/2014/main" id="{448E4AFE-E166-4B84-B0C8-9205038D8033}"/>
+                <a16:creationId xmlns:a16="http://schemas.microsoft.com/office/drawing/2014/main" xmlns="" id="{448E4AFE-E166-4B84-B0C8-9205038D8033}"/>
               </a:ext>
             </a:extLst>
           </p:cNvPr>
@@ -3936,7 +3939,7 @@
           <a:blip r:embed="rId16" cstate="screen">
             <a:extLst>
               <a:ext uri="{28A0092B-C50C-407E-A947-70E740481C1C}">
-                <a14:useLocalDpi xmlns:a14="http://schemas.microsoft.com/office/drawing/2010/main"/>
+                <a14:useLocalDpi xmlns:a14="http://schemas.microsoft.com/office/drawing/2010/main" xmlns=""/>
               </a:ext>
             </a:extLst>
           </a:blip>
@@ -3959,7 +3962,7 @@
           <p:cNvPr id="2" name="Title Placeholder 1">
             <a:extLst>
               <a:ext uri="{FF2B5EF4-FFF2-40B4-BE49-F238E27FC236}">
-                <a16:creationId xmlns:a16="http://schemas.microsoft.com/office/drawing/2014/main" id="{6C617517-B672-49BA-AC6E-AB66D0639A58}"/>
+                <a16:creationId xmlns:a16="http://schemas.microsoft.com/office/drawing/2014/main" xmlns="" id="{6C617517-B672-49BA-AC6E-AB66D0639A58}"/>
               </a:ext>
             </a:extLst>
           </p:cNvPr>
@@ -3998,7 +4001,7 @@
           <p:cNvPr id="3" name="Text Placeholder 2">
             <a:extLst>
               <a:ext uri="{FF2B5EF4-FFF2-40B4-BE49-F238E27FC236}">
-                <a16:creationId xmlns:a16="http://schemas.microsoft.com/office/drawing/2014/main" id="{6EC92C27-7843-4B22-9200-B7304E6AE4CD}"/>
+                <a16:creationId xmlns:a16="http://schemas.microsoft.com/office/drawing/2014/main" xmlns="" id="{6EC92C27-7843-4B22-9200-B7304E6AE4CD}"/>
               </a:ext>
             </a:extLst>
           </p:cNvPr>
@@ -4066,7 +4069,7 @@
           <p:cNvPr id="6" name="Slide Number Placeholder 5">
             <a:extLst>
               <a:ext uri="{FF2B5EF4-FFF2-40B4-BE49-F238E27FC236}">
-                <a16:creationId xmlns:a16="http://schemas.microsoft.com/office/drawing/2014/main" id="{52DB4F10-F75B-41A8-B994-BFF68949E59A}"/>
+                <a16:creationId xmlns:a16="http://schemas.microsoft.com/office/drawing/2014/main" xmlns="" id="{52DB4F10-F75B-41A8-B994-BFF68949E59A}"/>
               </a:ext>
             </a:extLst>
           </p:cNvPr>
@@ -4122,7 +4125,7 @@
           <p:cNvPr id="7" name="Rectangle 6">
             <a:extLst>
               <a:ext uri="{FF2B5EF4-FFF2-40B4-BE49-F238E27FC236}">
-                <a16:creationId xmlns:a16="http://schemas.microsoft.com/office/drawing/2014/main" id="{512D21E2-8DEB-4F43-A26E-B8DA900A9230}"/>
+                <a16:creationId xmlns:a16="http://schemas.microsoft.com/office/drawing/2014/main" xmlns="" id="{512D21E2-8DEB-4F43-A26E-B8DA900A9230}"/>
               </a:ext>
             </a:extLst>
           </p:cNvPr>
@@ -4185,7 +4188,7 @@
           <p:cNvPr id="8" name="Rectangle 7">
             <a:extLst>
               <a:ext uri="{FF2B5EF4-FFF2-40B4-BE49-F238E27FC236}">
-                <a16:creationId xmlns:a16="http://schemas.microsoft.com/office/drawing/2014/main" id="{35CD3143-7FD1-40EA-AA4A-47C72380AEC2}"/>
+                <a16:creationId xmlns:a16="http://schemas.microsoft.com/office/drawing/2014/main" xmlns="" id="{35CD3143-7FD1-40EA-AA4A-47C72380AEC2}"/>
               </a:ext>
             </a:extLst>
           </p:cNvPr>
@@ -4235,7 +4238,7 @@
     </p:spTree>
     <p:extLst>
       <p:ext uri="{BB962C8B-B14F-4D97-AF65-F5344CB8AC3E}">
-        <p14:creationId xmlns:p14="http://schemas.microsoft.com/office/powerpoint/2010/main" val="3853920126"/>
+        <p14:creationId xmlns:p14="http://schemas.microsoft.com/office/powerpoint/2010/main" xmlns="" val="3853920126"/>
       </p:ext>
     </p:extLst>
   </p:cSld>
@@ -4565,7 +4568,7 @@
           <p:cNvPr id="4" name="Title 3">
             <a:extLst>
               <a:ext uri="{FF2B5EF4-FFF2-40B4-BE49-F238E27FC236}">
-                <a16:creationId xmlns:a16="http://schemas.microsoft.com/office/drawing/2014/main" id="{E10C5037-DA4A-44E2-A9FB-84B1498768A7}"/>
+                <a16:creationId xmlns:a16="http://schemas.microsoft.com/office/drawing/2014/main" xmlns="" id="{E10C5037-DA4A-44E2-A9FB-84B1498768A7}"/>
               </a:ext>
             </a:extLst>
           </p:cNvPr>
@@ -4602,7 +4605,7 @@
           <p:cNvPr id="15" name="Slide Number Placeholder 14">
             <a:extLst>
               <a:ext uri="{FF2B5EF4-FFF2-40B4-BE49-F238E27FC236}">
-                <a16:creationId xmlns:a16="http://schemas.microsoft.com/office/drawing/2014/main" id="{26F5C050-EB87-421A-8A5C-E6CB30102699}"/>
+                <a16:creationId xmlns:a16="http://schemas.microsoft.com/office/drawing/2014/main" xmlns="" id="{26F5C050-EB87-421A-8A5C-E6CB30102699}"/>
               </a:ext>
             </a:extLst>
           </p:cNvPr>
@@ -4636,7 +4639,7 @@
           <p:cNvPr id="29" name="Picture Placeholder 28" descr="Young student drawing on a whiteboard">
             <a:extLst>
               <a:ext uri="{FF2B5EF4-FFF2-40B4-BE49-F238E27FC236}">
-                <a16:creationId xmlns:a16="http://schemas.microsoft.com/office/drawing/2014/main" id="{AE2FE2E9-1D1E-404B-A659-DD19B5D66B5B}"/>
+                <a16:creationId xmlns:a16="http://schemas.microsoft.com/office/drawing/2014/main" xmlns="" id="{AE2FE2E9-1D1E-404B-A659-DD19B5D66B5B}"/>
               </a:ext>
             </a:extLst>
           </p:cNvPr>
@@ -4651,7 +4654,7 @@
           <a:blip r:embed="rId2" cstate="screen">
             <a:extLst>
               <a:ext uri="{28A0092B-C50C-407E-A947-70E740481C1C}">
-                <a14:useLocalDpi xmlns:a14="http://schemas.microsoft.com/office/drawing/2010/main"/>
+                <a14:useLocalDpi xmlns:a14="http://schemas.microsoft.com/office/drawing/2010/main" xmlns=""/>
               </a:ext>
             </a:extLst>
           </a:blip>
@@ -4670,7 +4673,7 @@
     </p:spTree>
     <p:extLst>
       <p:ext uri="{BB962C8B-B14F-4D97-AF65-F5344CB8AC3E}">
-        <p14:creationId xmlns:p14="http://schemas.microsoft.com/office/powerpoint/2010/main" val="1136250268"/>
+        <p14:creationId xmlns:p14="http://schemas.microsoft.com/office/powerpoint/2010/main" xmlns="" val="1136250268"/>
       </p:ext>
     </p:extLst>
   </p:cSld>
@@ -4709,7 +4712,7 @@
           <p:cNvPr id="2" name="Title 1">
             <a:extLst>
               <a:ext uri="{FF2B5EF4-FFF2-40B4-BE49-F238E27FC236}">
-                <a16:creationId xmlns:a16="http://schemas.microsoft.com/office/drawing/2014/main" id="{E199600F-A17E-4354-A7AB-0CC2A43A9354}"/>
+                <a16:creationId xmlns:a16="http://schemas.microsoft.com/office/drawing/2014/main" xmlns="" id="{E199600F-A17E-4354-A7AB-0CC2A43A9354}"/>
               </a:ext>
             </a:extLst>
           </p:cNvPr>
@@ -4763,7 +4766,19 @@
           <a:p>
             <a:r>
               <a:rPr lang="en-US" sz="2800" dirty="0" smtClean="0"/>
-              <a:t>Parameters to a method can be passed using a technique called as pass-by-value.</a:t>
+              <a:t>Parameters to a method can be passed using a technique called as </a:t>
+            </a:r>
+            <a:r>
+              <a:rPr lang="en-US" sz="2800" b="1" i="1" dirty="0" smtClean="0">
+                <a:solidFill>
+                  <a:srgbClr val="FFFF00"/>
+                </a:solidFill>
+              </a:rPr>
+              <a:t>pass-by-value</a:t>
+            </a:r>
+            <a:r>
+              <a:rPr lang="en-US" sz="2800" dirty="0" smtClean="0"/>
+              <a:t>.</a:t>
             </a:r>
           </a:p>
           <a:p>
@@ -4792,7 +4807,7 @@
           <p:cNvPr id="4" name="Slide Number Placeholder 3">
             <a:extLst>
               <a:ext uri="{FF2B5EF4-FFF2-40B4-BE49-F238E27FC236}">
-                <a16:creationId xmlns:a16="http://schemas.microsoft.com/office/drawing/2014/main" id="{62B4CE3A-8C88-45AA-A849-57E5A7AC22C1}"/>
+                <a16:creationId xmlns:a16="http://schemas.microsoft.com/office/drawing/2014/main" xmlns="" id="{62B4CE3A-8C88-45AA-A849-57E5A7AC22C1}"/>
               </a:ext>
             </a:extLst>
           </p:cNvPr>
@@ -4826,10 +4841,10 @@
           <p:cNvPr id="11" name="Rectangle 10">
             <a:extLst>
               <a:ext uri="{FF2B5EF4-FFF2-40B4-BE49-F238E27FC236}">
-                <a16:creationId xmlns:a16="http://schemas.microsoft.com/office/drawing/2014/main" id="{5F253864-26FA-4AB1-9F0A-4F57D870EE85}"/>
+                <a16:creationId xmlns:a16="http://schemas.microsoft.com/office/drawing/2014/main" xmlns="" id="{5F253864-26FA-4AB1-9F0A-4F57D870EE85}"/>
               </a:ext>
               <a:ext uri="{C183D7F6-B498-43B3-948B-1728B52AA6E4}">
-                <adec:decorative xmlns="" xmlns:adec="http://schemas.microsoft.com/office/drawing/2017/decorative" val="1"/>
+                <adec:decorative xmlns:adec="http://schemas.microsoft.com/office/drawing/2017/decorative" xmlns="" val="1"/>
               </a:ext>
             </a:extLst>
           </p:cNvPr>
@@ -4882,7 +4897,7 @@
     </p:spTree>
     <p:extLst>
       <p:ext uri="{BB962C8B-B14F-4D97-AF65-F5344CB8AC3E}">
-        <p14:creationId xmlns:p14="http://schemas.microsoft.com/office/powerpoint/2010/main" val="3716105547"/>
+        <p14:creationId xmlns:p14="http://schemas.microsoft.com/office/powerpoint/2010/main" xmlns="" val="3716105547"/>
       </p:ext>
     </p:extLst>
   </p:cSld>
@@ -4921,7 +4936,7 @@
           <p:cNvPr id="2" name="Title 1">
             <a:extLst>
               <a:ext uri="{FF2B5EF4-FFF2-40B4-BE49-F238E27FC236}">
-                <a16:creationId xmlns:a16="http://schemas.microsoft.com/office/drawing/2014/main" id="{E199600F-A17E-4354-A7AB-0CC2A43A9354}"/>
+                <a16:creationId xmlns:a16="http://schemas.microsoft.com/office/drawing/2014/main" xmlns="" id="{E199600F-A17E-4354-A7AB-0CC2A43A9354}"/>
               </a:ext>
             </a:extLst>
           </p:cNvPr>
@@ -5032,7 +5047,7 @@
           <p:cNvPr id="4" name="Slide Number Placeholder 3">
             <a:extLst>
               <a:ext uri="{FF2B5EF4-FFF2-40B4-BE49-F238E27FC236}">
-                <a16:creationId xmlns:a16="http://schemas.microsoft.com/office/drawing/2014/main" id="{62B4CE3A-8C88-45AA-A849-57E5A7AC22C1}"/>
+                <a16:creationId xmlns:a16="http://schemas.microsoft.com/office/drawing/2014/main" xmlns="" id="{62B4CE3A-8C88-45AA-A849-57E5A7AC22C1}"/>
               </a:ext>
             </a:extLst>
           </p:cNvPr>
@@ -5066,10 +5081,10 @@
           <p:cNvPr id="11" name="Rectangle 10">
             <a:extLst>
               <a:ext uri="{FF2B5EF4-FFF2-40B4-BE49-F238E27FC236}">
-                <a16:creationId xmlns:a16="http://schemas.microsoft.com/office/drawing/2014/main" id="{5F253864-26FA-4AB1-9F0A-4F57D870EE85}"/>
+                <a16:creationId xmlns:a16="http://schemas.microsoft.com/office/drawing/2014/main" xmlns="" id="{5F253864-26FA-4AB1-9F0A-4F57D870EE85}"/>
               </a:ext>
               <a:ext uri="{C183D7F6-B498-43B3-948B-1728B52AA6E4}">
-                <adec:decorative xmlns="" xmlns:adec="http://schemas.microsoft.com/office/drawing/2017/decorative" val="1"/>
+                <adec:decorative xmlns:adec="http://schemas.microsoft.com/office/drawing/2017/decorative" xmlns="" val="1"/>
               </a:ext>
             </a:extLst>
           </p:cNvPr>
@@ -5122,7 +5137,7 @@
     </p:spTree>
     <p:extLst>
       <p:ext uri="{BB962C8B-B14F-4D97-AF65-F5344CB8AC3E}">
-        <p14:creationId xmlns:p14="http://schemas.microsoft.com/office/powerpoint/2010/main" val="1367291688"/>
+        <p14:creationId xmlns:p14="http://schemas.microsoft.com/office/powerpoint/2010/main" xmlns="" val="1367291688"/>
       </p:ext>
     </p:extLst>
   </p:cSld>
@@ -5161,7 +5176,7 @@
           <p:cNvPr id="2" name="Title 1">
             <a:extLst>
               <a:ext uri="{FF2B5EF4-FFF2-40B4-BE49-F238E27FC236}">
-                <a16:creationId xmlns:a16="http://schemas.microsoft.com/office/drawing/2014/main" id="{E199600F-A17E-4354-A7AB-0CC2A43A9354}"/>
+                <a16:creationId xmlns:a16="http://schemas.microsoft.com/office/drawing/2014/main" xmlns="" id="{E199600F-A17E-4354-A7AB-0CC2A43A9354}"/>
               </a:ext>
             </a:extLst>
           </p:cNvPr>
@@ -5209,7 +5224,7 @@
         </p:spPr>
         <p:txBody>
           <a:bodyPr>
-            <a:normAutofit fontScale="92500"/>
+            <a:normAutofit fontScale="92500" lnSpcReduction="20000"/>
           </a:bodyPr>
           <a:lstStyle/>
           <a:p>
@@ -5249,7 +5264,38 @@
             <a:pPr lvl="1"/>
             <a:r>
               <a:rPr lang="en-US" sz="2600" dirty="0" smtClean="0"/>
-              <a:t>It can be overloaded and hence different versions of overloaded constructor can be called while creating an object using the new operator.</a:t>
+              <a:t>It can be overloaded and hence different versions of </a:t>
+            </a:r>
+            <a:r>
+              <a:rPr lang="en-US" sz="2600" b="1" i="1" dirty="0" smtClean="0">
+                <a:solidFill>
+                  <a:srgbClr val="FFFF00"/>
+                </a:solidFill>
+              </a:rPr>
+              <a:t>overloaded constructor </a:t>
+            </a:r>
+            <a:r>
+              <a:rPr lang="en-US" sz="2600" dirty="0" smtClean="0"/>
+              <a:t>can be called while creating an object using the new operator.</a:t>
+            </a:r>
+          </a:p>
+          <a:p>
+            <a:pPr lvl="1"/>
+            <a:r>
+              <a:rPr lang="en-US" sz="2600" dirty="0" smtClean="0"/>
+              <a:t>Every class by default has </a:t>
+            </a:r>
+            <a:r>
+              <a:rPr lang="en-US" sz="2600" b="1" i="1" dirty="0" smtClean="0">
+                <a:solidFill>
+                  <a:srgbClr val="FFFF00"/>
+                </a:solidFill>
+              </a:rPr>
+              <a:t>default constructor</a:t>
+            </a:r>
+            <a:r>
+              <a:rPr lang="en-US" sz="2600" dirty="0" smtClean="0"/>
+              <a:t>. So even if we don’t declare any constructor ,every class has a no argument default constructor.</a:t>
             </a:r>
           </a:p>
         </p:txBody>
@@ -5259,7 +5305,7 @@
           <p:cNvPr id="4" name="Slide Number Placeholder 3">
             <a:extLst>
               <a:ext uri="{FF2B5EF4-FFF2-40B4-BE49-F238E27FC236}">
-                <a16:creationId xmlns:a16="http://schemas.microsoft.com/office/drawing/2014/main" id="{62B4CE3A-8C88-45AA-A849-57E5A7AC22C1}"/>
+                <a16:creationId xmlns:a16="http://schemas.microsoft.com/office/drawing/2014/main" xmlns="" id="{62B4CE3A-8C88-45AA-A849-57E5A7AC22C1}"/>
               </a:ext>
             </a:extLst>
           </p:cNvPr>
@@ -5293,10 +5339,10 @@
           <p:cNvPr id="11" name="Rectangle 10">
             <a:extLst>
               <a:ext uri="{FF2B5EF4-FFF2-40B4-BE49-F238E27FC236}">
-                <a16:creationId xmlns:a16="http://schemas.microsoft.com/office/drawing/2014/main" id="{5F253864-26FA-4AB1-9F0A-4F57D870EE85}"/>
+                <a16:creationId xmlns:a16="http://schemas.microsoft.com/office/drawing/2014/main" xmlns="" id="{5F253864-26FA-4AB1-9F0A-4F57D870EE85}"/>
               </a:ext>
               <a:ext uri="{C183D7F6-B498-43B3-948B-1728B52AA6E4}">
-                <adec:decorative xmlns="" xmlns:adec="http://schemas.microsoft.com/office/drawing/2017/decorative" val="1"/>
+                <adec:decorative xmlns:adec="http://schemas.microsoft.com/office/drawing/2017/decorative" xmlns="" val="1"/>
               </a:ext>
             </a:extLst>
           </p:cNvPr>
@@ -5349,7 +5395,7 @@
     </p:spTree>
     <p:extLst>
       <p:ext uri="{BB962C8B-B14F-4D97-AF65-F5344CB8AC3E}">
-        <p14:creationId xmlns:p14="http://schemas.microsoft.com/office/powerpoint/2010/main" val="1189419766"/>
+        <p14:creationId xmlns:p14="http://schemas.microsoft.com/office/powerpoint/2010/main" xmlns="" val="3739068852"/>
       </p:ext>
     </p:extLst>
   </p:cSld>
@@ -5388,7 +5434,7 @@
           <p:cNvPr id="2" name="Title 1">
             <a:extLst>
               <a:ext uri="{FF2B5EF4-FFF2-40B4-BE49-F238E27FC236}">
-                <a16:creationId xmlns:a16="http://schemas.microsoft.com/office/drawing/2014/main" id="{E199600F-A17E-4354-A7AB-0CC2A43A9354}"/>
+                <a16:creationId xmlns:a16="http://schemas.microsoft.com/office/drawing/2014/main" xmlns="" id="{E199600F-A17E-4354-A7AB-0CC2A43A9354}"/>
               </a:ext>
             </a:extLst>
           </p:cNvPr>
@@ -5401,8 +5447,8 @@
         </p:nvSpPr>
         <p:spPr>
           <a:xfrm>
-            <a:off x="838200" y="641855"/>
-            <a:ext cx="10515600" cy="772107"/>
+            <a:off x="838199" y="611079"/>
+            <a:ext cx="10515600" cy="833663"/>
           </a:xfrm>
         </p:spPr>
         <p:txBody>
@@ -5411,8 +5457,12 @@
           <a:p>
             <a:pPr algn="ctr"/>
             <a:r>
+              <a:rPr lang="en-US" dirty="0"/>
+              <a:t>Constructors : </a:t>
+            </a:r>
+            <a:r>
               <a:rPr lang="en-US" dirty="0" smtClean="0"/>
-              <a:t>Constructors : Object Initializers</a:t>
+              <a:t>Instance Initializers</a:t>
             </a:r>
             <a:endParaRPr lang="en-US" dirty="0"/>
           </a:p>
@@ -5420,7 +5470,13 @@
       </p:sp>
       <p:sp>
         <p:nvSpPr>
-          <p:cNvPr id="6" name="Content Placeholder 5"/>
+          <p:cNvPr id="3" name="Content Placeholder 2">
+            <a:extLst>
+              <a:ext uri="{FF2B5EF4-FFF2-40B4-BE49-F238E27FC236}">
+                <a16:creationId xmlns:a16="http://schemas.microsoft.com/office/drawing/2014/main" xmlns="" id="{FA6A4B49-27C8-46B6-8B11-AD7E8F615E2C}"/>
+              </a:ext>
+            </a:extLst>
+          </p:cNvPr>
           <p:cNvSpPr>
             <a:spLocks noGrp="1"/>
           </p:cNvSpPr>
@@ -5430,61 +5486,59 @@
         </p:nvSpPr>
         <p:spPr>
           <a:xfrm>
-            <a:off x="682625" y="2010137"/>
-            <a:ext cx="10515600" cy="4351338"/>
+            <a:off x="838199" y="1834861"/>
+            <a:ext cx="10515599" cy="4351338"/>
           </a:xfrm>
         </p:spPr>
         <p:txBody>
           <a:bodyPr>
-            <a:normAutofit fontScale="92500" lnSpcReduction="20000"/>
+            <a:normAutofit lnSpcReduction="10000"/>
           </a:bodyPr>
           <a:lstStyle/>
           <a:p>
             <a:r>
-              <a:rPr lang="en-US" sz="2800" dirty="0" smtClean="0"/>
-              <a:t>Objects in java are created using the new operator. The new operator is followed by a method call , in which the name of the method is same as that of the class of object. This is a special method called as a constructor. Its primary work is to allow the writers of a class to initialize their objects with appropriate values.</a:t>
-            </a:r>
-          </a:p>
-          <a:p>
-            <a:r>
-              <a:rPr lang="en-US" sz="2800" dirty="0" smtClean="0"/>
-              <a:t>Following points are worth noticeable about constructors :  </a:t>
-            </a:r>
-          </a:p>
-          <a:p>
-            <a:pPr lvl="1"/>
-            <a:r>
-              <a:rPr lang="en-US" sz="2600" dirty="0" smtClean="0"/>
-              <a:t>Name of the constructor is same as the name of the class.</a:t>
-            </a:r>
-          </a:p>
-          <a:p>
-            <a:pPr lvl="1"/>
-            <a:r>
-              <a:rPr lang="en-US" sz="2600" dirty="0" smtClean="0"/>
-              <a:t>It does not have a return type.</a:t>
-            </a:r>
-          </a:p>
-          <a:p>
-            <a:pPr lvl="1"/>
-            <a:r>
-              <a:rPr lang="en-US" sz="2600" dirty="0" smtClean="0"/>
-              <a:t>It can have accessibility specifiers.</a:t>
-            </a:r>
-          </a:p>
-          <a:p>
-            <a:pPr lvl="1"/>
-            <a:r>
-              <a:rPr lang="en-US" sz="2600" dirty="0" smtClean="0"/>
-              <a:t>It can be overloaded and hence different versions of overloaded constructor can be called while creating an object using the new operator.</a:t>
-            </a:r>
-          </a:p>
-          <a:p>
-            <a:pPr lvl="1"/>
-            <a:r>
-              <a:rPr lang="en-US" sz="2600" dirty="0" smtClean="0"/>
-              <a:t>Every class by default has default constructor. So even if we don’t declare any constructor ,every class has a no argument default constructor.</a:t>
-            </a:r>
+              <a:rPr lang="en-US" dirty="0" smtClean="0"/>
+              <a:t>Instance initializer blocks are curly braced blocks of code that are used for initialization of the object of the class. They are not part of any method but are independent blocks of code. A class can have any number of </a:t>
+            </a:r>
+            <a:r>
+              <a:rPr lang="en-US" b="1" i="1" dirty="0" smtClean="0">
+                <a:solidFill>
+                  <a:srgbClr val="FFFF00"/>
+                </a:solidFill>
+              </a:rPr>
+              <a:t>instance initializer blocks </a:t>
+            </a:r>
+            <a:r>
+              <a:rPr lang="en-US" dirty="0" smtClean="0"/>
+              <a:t>and are executed in order in which they are specified in the class.</a:t>
+            </a:r>
+          </a:p>
+          <a:p>
+            <a:r>
+              <a:rPr lang="en-US" dirty="0" smtClean="0"/>
+              <a:t> These are used to initialize all the member variables of the class including static as well as non-static.</a:t>
+            </a:r>
+          </a:p>
+          <a:p>
+            <a:r>
+              <a:rPr lang="en-US" dirty="0" smtClean="0"/>
+              <a:t>Expressions in an instance initializer block follow a declare-before-read rule. This means that an expression inside of instance initializer block can read the value of a variable only if the variable is already declared before the instance initializer block.</a:t>
+            </a:r>
+          </a:p>
+          <a:p>
+            <a:r>
+              <a:rPr lang="en-US" dirty="0" smtClean="0"/>
+              <a:t>Alternatively if an expression forward references a variable inside of instance initializer i.e. uses a variable before it has been declared then it is only allowed to assign a value to the forward referencing variable but cannot read from the yet undeclared variable.</a:t>
+            </a:r>
+          </a:p>
+          <a:p>
+            <a:r>
+              <a:rPr lang="en-US" dirty="0" smtClean="0"/>
+              <a:t>Instance initializer blocks are generally not needed in common programming practice. It only comes in handy in cases where there are multiple constructors in a class and there needs to be a common code that needs to be called no matter which constructor gets called.</a:t>
+            </a:r>
+          </a:p>
+          <a:p>
+            <a:endParaRPr lang="en-US" sz="2800" b="1" dirty="0" smtClean="0"/>
           </a:p>
         </p:txBody>
       </p:sp>
@@ -5493,7 +5547,7 @@
           <p:cNvPr id="4" name="Slide Number Placeholder 3">
             <a:extLst>
               <a:ext uri="{FF2B5EF4-FFF2-40B4-BE49-F238E27FC236}">
-                <a16:creationId xmlns:a16="http://schemas.microsoft.com/office/drawing/2014/main" id="{62B4CE3A-8C88-45AA-A849-57E5A7AC22C1}"/>
+                <a16:creationId xmlns:a16="http://schemas.microsoft.com/office/drawing/2014/main" xmlns="" id="{62B4CE3A-8C88-45AA-A849-57E5A7AC22C1}"/>
               </a:ext>
             </a:extLst>
           </p:cNvPr>
@@ -5504,7 +5558,12 @@
             <p:ph type="sldNum" sz="quarter" idx="10"/>
           </p:nvPr>
         </p:nvSpPr>
-        <p:spPr/>
+        <p:spPr>
+          <a:xfrm>
+            <a:off x="11353800" y="6361475"/>
+            <a:ext cx="838200" cy="360000"/>
+          </a:xfrm>
+        </p:spPr>
         <p:txBody>
           <a:bodyPr/>
           <a:lstStyle/>
@@ -5527,10 +5586,10 @@
           <p:cNvPr id="11" name="Rectangle 10">
             <a:extLst>
               <a:ext uri="{FF2B5EF4-FFF2-40B4-BE49-F238E27FC236}">
-                <a16:creationId xmlns:a16="http://schemas.microsoft.com/office/drawing/2014/main" id="{5F253864-26FA-4AB1-9F0A-4F57D870EE85}"/>
+                <a16:creationId xmlns:a16="http://schemas.microsoft.com/office/drawing/2014/main" xmlns="" id="{5F253864-26FA-4AB1-9F0A-4F57D870EE85}"/>
               </a:ext>
               <a:ext uri="{C183D7F6-B498-43B3-948B-1728B52AA6E4}">
-                <adec:decorative xmlns="" xmlns:adec="http://schemas.microsoft.com/office/drawing/2017/decorative" val="1"/>
+                <adec:decorative xmlns:adec="http://schemas.microsoft.com/office/drawing/2017/decorative" xmlns="" val="1"/>
               </a:ext>
             </a:extLst>
           </p:cNvPr>
@@ -5583,7 +5642,7 @@
     </p:spTree>
     <p:extLst>
       <p:ext uri="{BB962C8B-B14F-4D97-AF65-F5344CB8AC3E}">
-        <p14:creationId xmlns:p14="http://schemas.microsoft.com/office/powerpoint/2010/main" val="3739068852"/>
+        <p14:creationId xmlns:p14="http://schemas.microsoft.com/office/powerpoint/2010/main" xmlns="" val="1221906720"/>
       </p:ext>
     </p:extLst>
   </p:cSld>
@@ -5622,7 +5681,7 @@
           <p:cNvPr id="2" name="Title 1">
             <a:extLst>
               <a:ext uri="{FF2B5EF4-FFF2-40B4-BE49-F238E27FC236}">
-                <a16:creationId xmlns:a16="http://schemas.microsoft.com/office/drawing/2014/main" id="{E199600F-A17E-4354-A7AB-0CC2A43A9354}"/>
+                <a16:creationId xmlns:a16="http://schemas.microsoft.com/office/drawing/2014/main" xmlns="" id="{E199600F-A17E-4354-A7AB-0CC2A43A9354}"/>
               </a:ext>
             </a:extLst>
           </p:cNvPr>
@@ -5635,8 +5694,8 @@
         </p:nvSpPr>
         <p:spPr>
           <a:xfrm>
-            <a:off x="838199" y="611079"/>
-            <a:ext cx="10515600" cy="833663"/>
+            <a:off x="838200" y="641855"/>
+            <a:ext cx="10515600" cy="772107"/>
           </a:xfrm>
         </p:spPr>
         <p:txBody>
@@ -5645,12 +5704,8 @@
           <a:p>
             <a:pPr algn="ctr"/>
             <a:r>
-              <a:rPr lang="en-US" dirty="0"/>
-              <a:t>Constructors : </a:t>
-            </a:r>
-            <a:r>
               <a:rPr lang="en-US" dirty="0" smtClean="0"/>
-              <a:t>Instance Initializers</a:t>
+              <a:t>Static Members</a:t>
             </a:r>
             <a:endParaRPr lang="en-US" dirty="0"/>
           </a:p>
@@ -5658,72 +5713,10 @@
       </p:sp>
       <p:sp>
         <p:nvSpPr>
-          <p:cNvPr id="3" name="Content Placeholder 2">
-            <a:extLst>
-              <a:ext uri="{FF2B5EF4-FFF2-40B4-BE49-F238E27FC236}">
-                <a16:creationId xmlns:a16="http://schemas.microsoft.com/office/drawing/2014/main" id="{FA6A4B49-27C8-46B6-8B11-AD7E8F615E2C}"/>
-              </a:ext>
-            </a:extLst>
-          </p:cNvPr>
-          <p:cNvSpPr>
-            <a:spLocks noGrp="1"/>
-          </p:cNvSpPr>
-          <p:nvPr>
-            <p:ph idx="1"/>
-          </p:nvPr>
-        </p:nvSpPr>
-        <p:spPr>
-          <a:xfrm>
-            <a:off x="838199" y="1834861"/>
-            <a:ext cx="10515599" cy="4351338"/>
-          </a:xfrm>
-        </p:spPr>
-        <p:txBody>
-          <a:bodyPr>
-            <a:normAutofit lnSpcReduction="10000"/>
-          </a:bodyPr>
-          <a:lstStyle/>
-          <a:p>
-            <a:r>
-              <a:rPr lang="en-US" dirty="0" smtClean="0"/>
-              <a:t>Instance initializer blocks are curly braced blocks of code that are used for initialization of the object of the class. They are not part of any method but are independent blocks of code. A class can have any number of instance initializer blocks and are executed in order in which they are specified in the class.</a:t>
-            </a:r>
-          </a:p>
-          <a:p>
-            <a:r>
-              <a:rPr lang="en-US" dirty="0" smtClean="0"/>
-              <a:t> These are used to initialize all the member variables of the class including static as well as non-static.</a:t>
-            </a:r>
-          </a:p>
-          <a:p>
-            <a:r>
-              <a:rPr lang="en-US" dirty="0" smtClean="0"/>
-              <a:t>Expressions in an instance initializer block follow a declare-before-read rule. This means that an expression inside of instance initializer block can read the value of a variable only if the variable is already declared before the instance initializer block.</a:t>
-            </a:r>
-          </a:p>
-          <a:p>
-            <a:r>
-              <a:rPr lang="en-US" dirty="0" smtClean="0"/>
-              <a:t>Alternatively if an expression forward references a variable inside of instance initializer i.e. uses a variable before it has been declared then it is only allowed to assign a value to the forward referencing variable but cannot read from the yet undeclared variable.</a:t>
-            </a:r>
-          </a:p>
-          <a:p>
-            <a:r>
-              <a:rPr lang="en-US" dirty="0" smtClean="0"/>
-              <a:t>Instance initializer blocks are generally not needed in common programming practice. It only comes in handy in cases where there are multiple constructors in a class and there needs to be a common code that needs to be called no matter which constructor gets called.</a:t>
-            </a:r>
-          </a:p>
-          <a:p>
-            <a:endParaRPr lang="en-US" sz="2800" b="1" dirty="0" smtClean="0"/>
-          </a:p>
-        </p:txBody>
-      </p:sp>
-      <p:sp>
-        <p:nvSpPr>
           <p:cNvPr id="4" name="Slide Number Placeholder 3">
             <a:extLst>
               <a:ext uri="{FF2B5EF4-FFF2-40B4-BE49-F238E27FC236}">
-                <a16:creationId xmlns:a16="http://schemas.microsoft.com/office/drawing/2014/main" id="{62B4CE3A-8C88-45AA-A849-57E5A7AC22C1}"/>
+                <a16:creationId xmlns:a16="http://schemas.microsoft.com/office/drawing/2014/main" xmlns="" id="{62B4CE3A-8C88-45AA-A849-57E5A7AC22C1}"/>
               </a:ext>
             </a:extLst>
           </p:cNvPr>
@@ -5734,12 +5727,7 @@
             <p:ph type="sldNum" sz="quarter" idx="10"/>
           </p:nvPr>
         </p:nvSpPr>
-        <p:spPr>
-          <a:xfrm>
-            <a:off x="11353800" y="6361475"/>
-            <a:ext cx="838200" cy="360000"/>
-          </a:xfrm>
-        </p:spPr>
+        <p:spPr/>
         <p:txBody>
           <a:bodyPr/>
           <a:lstStyle/>
@@ -5762,10 +5750,10 @@
           <p:cNvPr id="11" name="Rectangle 10">
             <a:extLst>
               <a:ext uri="{FF2B5EF4-FFF2-40B4-BE49-F238E27FC236}">
-                <a16:creationId xmlns:a16="http://schemas.microsoft.com/office/drawing/2014/main" id="{5F253864-26FA-4AB1-9F0A-4F57D870EE85}"/>
+                <a16:creationId xmlns:a16="http://schemas.microsoft.com/office/drawing/2014/main" xmlns="" id="{5F253864-26FA-4AB1-9F0A-4F57D870EE85}"/>
               </a:ext>
               <a:ext uri="{C183D7F6-B498-43B3-948B-1728B52AA6E4}">
-                <adec:decorative xmlns="" xmlns:adec="http://schemas.microsoft.com/office/drawing/2017/decorative" val="1"/>
+                <adec:decorative xmlns:adec="http://schemas.microsoft.com/office/drawing/2017/decorative" xmlns="" val="1"/>
               </a:ext>
             </a:extLst>
           </p:cNvPr>
@@ -5815,10 +5803,61 @@
           </a:p>
         </p:txBody>
       </p:sp>
+      <p:sp>
+        <p:nvSpPr>
+          <p:cNvPr id="7" name="Content Placeholder 6"/>
+          <p:cNvSpPr>
+            <a:spLocks noGrp="1"/>
+          </p:cNvSpPr>
+          <p:nvPr>
+            <p:ph idx="1"/>
+          </p:nvPr>
+        </p:nvSpPr>
+        <p:spPr/>
+        <p:txBody>
+          <a:bodyPr>
+            <a:normAutofit fontScale="92500"/>
+          </a:bodyPr>
+          <a:lstStyle/>
+          <a:p>
+            <a:endParaRPr lang="en-US" sz="2400" dirty="0" smtClean="0"/>
+          </a:p>
+          <a:p>
+            <a:r>
+              <a:rPr lang="en-US" sz="2400" dirty="0" smtClean="0"/>
+              <a:t>A class is a blueprint and out of this many object can be instantiated. Each object of the class has its own copy of all the non-static members of the class.</a:t>
+            </a:r>
+          </a:p>
+          <a:p>
+            <a:r>
+              <a:rPr lang="en-US" sz="2400" dirty="0" smtClean="0"/>
+              <a:t>Static members(methods, fields, nested types) of the class on the other hand are the properties of the declaring class. Objects of this class do not get a copy of static members. Instead they all share a common copy of the static members of the class.</a:t>
+            </a:r>
+          </a:p>
+          <a:p>
+            <a:r>
+              <a:rPr lang="en-US" sz="2400" dirty="0" smtClean="0"/>
+              <a:t>This means that if any change is done on the static member of the class , it is reflected at all places.</a:t>
+            </a:r>
+          </a:p>
+          <a:p>
+            <a:r>
+              <a:rPr lang="en-US" sz="2400" dirty="0" smtClean="0"/>
+              <a:t>Recommended way of using a static member of the class is &lt;Class Name&gt;.&lt;static member&gt;.</a:t>
+            </a:r>
+          </a:p>
+          <a:p>
+            <a:r>
+              <a:rPr lang="en-US" sz="2400" dirty="0" smtClean="0"/>
+              <a:t>Entry point function of any application in java which is the main() method is also declared static.</a:t>
+            </a:r>
+          </a:p>
+        </p:txBody>
+      </p:sp>
     </p:spTree>
     <p:extLst>
       <p:ext uri="{BB962C8B-B14F-4D97-AF65-F5344CB8AC3E}">
-        <p14:creationId xmlns:p14="http://schemas.microsoft.com/office/powerpoint/2010/main" val="1221906720"/>
+        <p14:creationId xmlns:p14="http://schemas.microsoft.com/office/powerpoint/2010/main" xmlns="" val="3058716343"/>
       </p:ext>
     </p:extLst>
   </p:cSld>
@@ -5857,7 +5896,7 @@
           <p:cNvPr id="2" name="Title 1">
             <a:extLst>
               <a:ext uri="{FF2B5EF4-FFF2-40B4-BE49-F238E27FC236}">
-                <a16:creationId xmlns:a16="http://schemas.microsoft.com/office/drawing/2014/main" id="{E199600F-A17E-4354-A7AB-0CC2A43A9354}"/>
+                <a16:creationId xmlns:a16="http://schemas.microsoft.com/office/drawing/2014/main" xmlns="" id="{C8F58AE6-56F6-44E8-8BBF-23277B1773E4}"/>
               </a:ext>
             </a:extLst>
           </p:cNvPr>
@@ -5868,12 +5907,7 @@
             <p:ph type="title"/>
           </p:nvPr>
         </p:nvSpPr>
-        <p:spPr>
-          <a:xfrm>
-            <a:off x="838200" y="641855"/>
-            <a:ext cx="10515600" cy="772107"/>
-          </a:xfrm>
-        </p:spPr>
+        <p:spPr/>
         <p:txBody>
           <a:bodyPr/>
           <a:lstStyle/>
@@ -5881,18 +5915,47 @@
             <a:pPr algn="ctr"/>
             <a:r>
               <a:rPr lang="en-US" dirty="0" smtClean="0"/>
-              <a:t>Static Members</a:t>
+              <a:t>Questions ??</a:t>
             </a:r>
             <a:endParaRPr lang="en-US" dirty="0"/>
           </a:p>
         </p:txBody>
       </p:sp>
-      <p:sp>
-        <p:nvSpPr>
-          <p:cNvPr id="4" name="Slide Number Placeholder 3">
-            <a:extLst>
-              <a:ext uri="{FF2B5EF4-FFF2-40B4-BE49-F238E27FC236}">
-                <a16:creationId xmlns:a16="http://schemas.microsoft.com/office/drawing/2014/main" id="{62B4CE3A-8C88-45AA-A849-57E5A7AC22C1}"/>
+      <p:pic>
+        <p:nvPicPr>
+          <p:cNvPr id="3" name="Content Placeholder 2"/>
+          <p:cNvPicPr>
+            <a:picLocks noGrp="1" noChangeAspect="1"/>
+          </p:cNvPicPr>
+          <p:nvPr>
+            <p:ph idx="1"/>
+          </p:nvPr>
+        </p:nvPicPr>
+        <p:blipFill>
+          <a:blip r:embed="rId2">
+            <a:extLst>
+              <a:ext uri="{28A0092B-C50C-407E-A947-70E740481C1C}">
+                <a14:useLocalDpi xmlns:a14="http://schemas.microsoft.com/office/drawing/2010/main" xmlns="" val="0"/>
+              </a:ext>
+            </a:extLst>
+          </a:blip>
+          <a:stretch>
+            <a:fillRect/>
+          </a:stretch>
+        </p:blipFill>
+        <p:spPr>
+          <a:xfrm>
+            <a:off x="4705350" y="1487686"/>
+            <a:ext cx="6648450" cy="3739753"/>
+          </a:xfrm>
+        </p:spPr>
+      </p:pic>
+      <p:sp>
+        <p:nvSpPr>
+          <p:cNvPr id="20" name="Slide Number Placeholder 19">
+            <a:extLst>
+              <a:ext uri="{FF2B5EF4-FFF2-40B4-BE49-F238E27FC236}">
+                <a16:creationId xmlns:a16="http://schemas.microsoft.com/office/drawing/2014/main" xmlns="" id="{3AEC0301-E9AA-4478-9E23-C372DBDCE653}"/>
               </a:ext>
             </a:extLst>
           </p:cNvPr>
@@ -5903,7 +5966,12 @@
             <p:ph type="sldNum" sz="quarter" idx="10"/>
           </p:nvPr>
         </p:nvSpPr>
-        <p:spPr/>
+        <p:spPr>
+          <a:xfrm>
+            <a:off x="10717695" y="6363134"/>
+            <a:ext cx="838200" cy="360000"/>
+          </a:xfrm>
+        </p:spPr>
         <p:txBody>
           <a:bodyPr/>
           <a:lstStyle/>
@@ -5923,13 +5991,13 @@
       </p:sp>
       <p:sp>
         <p:nvSpPr>
-          <p:cNvPr id="11" name="Rectangle 10">
-            <a:extLst>
-              <a:ext uri="{FF2B5EF4-FFF2-40B4-BE49-F238E27FC236}">
-                <a16:creationId xmlns:a16="http://schemas.microsoft.com/office/drawing/2014/main" id="{5F253864-26FA-4AB1-9F0A-4F57D870EE85}"/>
+          <p:cNvPr id="10" name="Isosceles Triangle 9">
+            <a:extLst>
+              <a:ext uri="{FF2B5EF4-FFF2-40B4-BE49-F238E27FC236}">
+                <a16:creationId xmlns:a16="http://schemas.microsoft.com/office/drawing/2014/main" xmlns="" id="{792980D7-ED01-4955-83DB-59BA18C94FBA}"/>
               </a:ext>
               <a:ext uri="{C183D7F6-B498-43B3-948B-1728B52AA6E4}">
-                <adec:decorative xmlns="" xmlns:adec="http://schemas.microsoft.com/office/drawing/2017/decorative" val="1"/>
+                <adec:decorative xmlns:adec="http://schemas.microsoft.com/office/drawing/2017/decorative" xmlns="" val="1"/>
               </a:ext>
             </a:extLst>
           </p:cNvPr>
@@ -5937,18 +6005,15 @@
           <p:nvPr/>
         </p:nvSpPr>
         <p:spPr>
-          <a:xfrm>
-            <a:off x="6249555" y="6562004"/>
-            <a:ext cx="2552123" cy="159471"/>
-          </a:xfrm>
-          <a:prstGeom prst="rect">
+          <a:xfrm rot="10800000">
+            <a:off x="10006315" y="6271566"/>
+            <a:ext cx="142847" cy="91567"/>
+          </a:xfrm>
+          <a:prstGeom prst="triangle">
             <a:avLst/>
           </a:prstGeom>
           <a:solidFill>
-            <a:schemeClr val="tx1">
-              <a:lumMod val="85000"/>
-              <a:lumOff val="15000"/>
-            </a:schemeClr>
+            <a:schemeClr val="bg1"/>
           </a:solidFill>
           <a:ln>
             <a:noFill/>
@@ -5971,251 +6036,6 @@
           </a:fontRef>
         </p:style>
         <p:txBody>
-          <a:bodyPr anchor="ctr"/>
-          <a:lstStyle/>
-          <a:p>
-            <a:pPr algn="ctr"/>
-            <a:endParaRPr lang="en-US" sz="1200" dirty="0"/>
-          </a:p>
-        </p:txBody>
-      </p:sp>
-      <p:sp>
-        <p:nvSpPr>
-          <p:cNvPr id="7" name="Content Placeholder 6"/>
-          <p:cNvSpPr>
-            <a:spLocks noGrp="1"/>
-          </p:cNvSpPr>
-          <p:nvPr>
-            <p:ph idx="1"/>
-          </p:nvPr>
-        </p:nvSpPr>
-        <p:spPr/>
-        <p:txBody>
-          <a:bodyPr>
-            <a:normAutofit fontScale="92500"/>
-          </a:bodyPr>
-          <a:lstStyle/>
-          <a:p>
-            <a:endParaRPr lang="en-US" sz="2400" dirty="0" smtClean="0"/>
-          </a:p>
-          <a:p>
-            <a:r>
-              <a:rPr lang="en-US" sz="2400" dirty="0" smtClean="0"/>
-              <a:t>A class is a blueprint and out of this many object can be instantiated. Each object of the class has its own copy of all the non-static members of the class.</a:t>
-            </a:r>
-          </a:p>
-          <a:p>
-            <a:r>
-              <a:rPr lang="en-US" sz="2400" dirty="0" smtClean="0"/>
-              <a:t>Static members(methods, fields, nested types) of the class on the other hand are the properties of the declaring class. Objects of this class do not get a copy of static members. Instead they all share a common copy of the static members of the class.</a:t>
-            </a:r>
-          </a:p>
-          <a:p>
-            <a:r>
-              <a:rPr lang="en-US" sz="2400" dirty="0" smtClean="0"/>
-              <a:t>This means that if any change is done on the static member of the class , it is reflected at all places.</a:t>
-            </a:r>
-          </a:p>
-          <a:p>
-            <a:r>
-              <a:rPr lang="en-US" sz="2400" dirty="0" smtClean="0"/>
-              <a:t>Recommended way of using a static member of the class is &lt;Class Name&gt;.&lt;static member&gt;.</a:t>
-            </a:r>
-          </a:p>
-          <a:p>
-            <a:r>
-              <a:rPr lang="en-US" sz="2400" dirty="0" smtClean="0"/>
-              <a:t>Entry point function of any application in java which is the main</a:t>
-            </a:r>
-            <a:r>
-              <a:rPr lang="en-US" sz="2400" dirty="0" smtClean="0"/>
-              <a:t>() method is also declared static.</a:t>
-            </a:r>
-            <a:endParaRPr lang="en-US" sz="2400" dirty="0" smtClean="0"/>
-          </a:p>
-        </p:txBody>
-      </p:sp>
-    </p:spTree>
-    <p:extLst>
-      <p:ext uri="{BB962C8B-B14F-4D97-AF65-F5344CB8AC3E}">
-        <p14:creationId xmlns:p14="http://schemas.microsoft.com/office/powerpoint/2010/main" val="3058716343"/>
-      </p:ext>
-    </p:extLst>
-  </p:cSld>
-  <p:clrMapOvr>
-    <a:masterClrMapping/>
-  </p:clrMapOvr>
-  <p:timing>
-    <p:tnLst>
-      <p:par>
-        <p:cTn id="1" dur="indefinite" restart="never" nodeType="tmRoot"/>
-      </p:par>
-    </p:tnLst>
-  </p:timing>
-</p:sld>
-</file>
-
-<file path=ppt/slides/slide16.xml><?xml version="1.0" encoding="utf-8"?>
-<p:sld xmlns:a="http://schemas.openxmlformats.org/drawingml/2006/main" xmlns:r="http://schemas.openxmlformats.org/officeDocument/2006/relationships" xmlns:p="http://schemas.openxmlformats.org/presentationml/2006/main">
-  <p:cSld>
-    <p:spTree>
-      <p:nvGrpSpPr>
-        <p:cNvPr id="1" name=""/>
-        <p:cNvGrpSpPr/>
-        <p:nvPr/>
-      </p:nvGrpSpPr>
-      <p:grpSpPr>
-        <a:xfrm>
-          <a:off x="0" y="0"/>
-          <a:ext cx="0" cy="0"/>
-          <a:chOff x="0" y="0"/>
-          <a:chExt cx="0" cy="0"/>
-        </a:xfrm>
-      </p:grpSpPr>
-      <p:sp>
-        <p:nvSpPr>
-          <p:cNvPr id="2" name="Title 1">
-            <a:extLst>
-              <a:ext uri="{FF2B5EF4-FFF2-40B4-BE49-F238E27FC236}">
-                <a16:creationId xmlns:a16="http://schemas.microsoft.com/office/drawing/2014/main" id="{C8F58AE6-56F6-44E8-8BBF-23277B1773E4}"/>
-              </a:ext>
-            </a:extLst>
-          </p:cNvPr>
-          <p:cNvSpPr>
-            <a:spLocks noGrp="1"/>
-          </p:cNvSpPr>
-          <p:nvPr>
-            <p:ph type="title"/>
-          </p:nvPr>
-        </p:nvSpPr>
-        <p:spPr/>
-        <p:txBody>
-          <a:bodyPr/>
-          <a:lstStyle/>
-          <a:p>
-            <a:r>
-              <a:rPr lang="en-US" smtClean="0"/>
-              <a:t>Questions ??</a:t>
-            </a:r>
-            <a:endParaRPr lang="en-US" dirty="0"/>
-          </a:p>
-        </p:txBody>
-      </p:sp>
-      <p:pic>
-        <p:nvPicPr>
-          <p:cNvPr id="3" name="Content Placeholder 2"/>
-          <p:cNvPicPr>
-            <a:picLocks noGrp="1" noChangeAspect="1"/>
-          </p:cNvPicPr>
-          <p:nvPr>
-            <p:ph idx="1"/>
-          </p:nvPr>
-        </p:nvPicPr>
-        <p:blipFill>
-          <a:blip r:embed="rId2">
-            <a:extLst>
-              <a:ext uri="{28A0092B-C50C-407E-A947-70E740481C1C}">
-                <a14:useLocalDpi xmlns:a14="http://schemas.microsoft.com/office/drawing/2010/main" val="0"/>
-              </a:ext>
-            </a:extLst>
-          </a:blip>
-          <a:stretch>
-            <a:fillRect/>
-          </a:stretch>
-        </p:blipFill>
-        <p:spPr>
-          <a:xfrm>
-            <a:off x="4705350" y="1487686"/>
-            <a:ext cx="6648450" cy="3739753"/>
-          </a:xfrm>
-        </p:spPr>
-      </p:pic>
-      <p:sp>
-        <p:nvSpPr>
-          <p:cNvPr id="20" name="Slide Number Placeholder 19">
-            <a:extLst>
-              <a:ext uri="{FF2B5EF4-FFF2-40B4-BE49-F238E27FC236}">
-                <a16:creationId xmlns:a16="http://schemas.microsoft.com/office/drawing/2014/main" id="{3AEC0301-E9AA-4478-9E23-C372DBDCE653}"/>
-              </a:ext>
-            </a:extLst>
-          </p:cNvPr>
-          <p:cNvSpPr>
-            <a:spLocks noGrp="1"/>
-          </p:cNvSpPr>
-          <p:nvPr>
-            <p:ph type="sldNum" sz="quarter" idx="10"/>
-          </p:nvPr>
-        </p:nvSpPr>
-        <p:spPr>
-          <a:xfrm>
-            <a:off x="10717695" y="6363134"/>
-            <a:ext cx="838200" cy="360000"/>
-          </a:xfrm>
-        </p:spPr>
-        <p:txBody>
-          <a:bodyPr/>
-          <a:lstStyle/>
-          <a:p>
-            <a:r>
-              <a:rPr lang="en-US" dirty="0"/>
-              <a:t>PAGE </a:t>
-            </a:r>
-            <a:fld id="{4A9B5881-4007-4345-955A-79C2656F0C49}" type="slidenum">
-              <a:rPr lang="en-US" smtClean="0"/>
-              <a:pPr/>
-              <a:t>16</a:t>
-            </a:fld>
-            <a:endParaRPr lang="en-US" dirty="0"/>
-          </a:p>
-        </p:txBody>
-      </p:sp>
-      <p:sp>
-        <p:nvSpPr>
-          <p:cNvPr id="10" name="Isosceles Triangle 9">
-            <a:extLst>
-              <a:ext uri="{FF2B5EF4-FFF2-40B4-BE49-F238E27FC236}">
-                <a16:creationId xmlns:a16="http://schemas.microsoft.com/office/drawing/2014/main" id="{792980D7-ED01-4955-83DB-59BA18C94FBA}"/>
-              </a:ext>
-              <a:ext uri="{C183D7F6-B498-43B3-948B-1728B52AA6E4}">
-                <adec:decorative xmlns="" xmlns:adec="http://schemas.microsoft.com/office/drawing/2017/decorative" val="1"/>
-              </a:ext>
-            </a:extLst>
-          </p:cNvPr>
-          <p:cNvSpPr/>
-          <p:nvPr/>
-        </p:nvSpPr>
-        <p:spPr>
-          <a:xfrm rot="10800000">
-            <a:off x="10006315" y="6271566"/>
-            <a:ext cx="142847" cy="91567"/>
-          </a:xfrm>
-          <a:prstGeom prst="triangle">
-            <a:avLst/>
-          </a:prstGeom>
-          <a:solidFill>
-            <a:schemeClr val="bg1"/>
-          </a:solidFill>
-          <a:ln>
-            <a:noFill/>
-          </a:ln>
-        </p:spPr>
-        <p:style>
-          <a:lnRef idx="2">
-            <a:schemeClr val="accent1">
-              <a:shade val="50000"/>
-            </a:schemeClr>
-          </a:lnRef>
-          <a:fillRef idx="1">
-            <a:schemeClr val="accent1"/>
-          </a:fillRef>
-          <a:effectRef idx="0">
-            <a:schemeClr val="accent1"/>
-          </a:effectRef>
-          <a:fontRef idx="minor">
-            <a:schemeClr val="lt1"/>
-          </a:fontRef>
-        </p:style>
-        <p:txBody>
           <a:bodyPr rtlCol="0" anchor="ctr"/>
           <a:lstStyle/>
           <a:p>
@@ -6255,7 +6075,7 @@
     </p:spTree>
     <p:extLst>
       <p:ext uri="{BB962C8B-B14F-4D97-AF65-F5344CB8AC3E}">
-        <p14:creationId xmlns:p14="http://schemas.microsoft.com/office/powerpoint/2010/main" val="1704949556"/>
+        <p14:creationId xmlns:p14="http://schemas.microsoft.com/office/powerpoint/2010/main" xmlns="" val="1704949556"/>
       </p:ext>
     </p:extLst>
   </p:cSld>
@@ -6294,7 +6114,7 @@
           <p:cNvPr id="2" name="Title 1">
             <a:extLst>
               <a:ext uri="{FF2B5EF4-FFF2-40B4-BE49-F238E27FC236}">
-                <a16:creationId xmlns:a16="http://schemas.microsoft.com/office/drawing/2014/main" id="{E199600F-A17E-4354-A7AB-0CC2A43A9354}"/>
+                <a16:creationId xmlns:a16="http://schemas.microsoft.com/office/drawing/2014/main" xmlns="" id="{E199600F-A17E-4354-A7AB-0CC2A43A9354}"/>
               </a:ext>
             </a:extLst>
           </p:cNvPr>
@@ -6315,9 +6135,14 @@
           <a:bodyPr/>
           <a:lstStyle/>
           <a:p>
+            <a:pPr algn="ctr"/>
             <a:r>
               <a:rPr lang="en-US" dirty="0" smtClean="0"/>
-              <a:t>                             Exam Objectives</a:t>
+              <a:t>Exam </a:t>
+            </a:r>
+            <a:r>
+              <a:rPr lang="en-US" dirty="0" smtClean="0"/>
+              <a:t>Objectives</a:t>
             </a:r>
             <a:endParaRPr lang="en-US" dirty="0"/>
           </a:p>
@@ -6328,7 +6153,7 @@
           <p:cNvPr id="3" name="Content Placeholder 2">
             <a:extLst>
               <a:ext uri="{FF2B5EF4-FFF2-40B4-BE49-F238E27FC236}">
-                <a16:creationId xmlns:a16="http://schemas.microsoft.com/office/drawing/2014/main" id="{FA6A4B49-27C8-46B6-8B11-AD7E8F615E2C}"/>
+                <a16:creationId xmlns:a16="http://schemas.microsoft.com/office/drawing/2014/main" xmlns="" id="{FA6A4B49-27C8-46B6-8B11-AD7E8F615E2C}"/>
               </a:ext>
             </a:extLst>
           </p:cNvPr>
@@ -6428,7 +6253,7 @@
           <p:cNvPr id="4" name="Slide Number Placeholder 3">
             <a:extLst>
               <a:ext uri="{FF2B5EF4-FFF2-40B4-BE49-F238E27FC236}">
-                <a16:creationId xmlns:a16="http://schemas.microsoft.com/office/drawing/2014/main" id="{62B4CE3A-8C88-45AA-A849-57E5A7AC22C1}"/>
+                <a16:creationId xmlns:a16="http://schemas.microsoft.com/office/drawing/2014/main" xmlns="" id="{62B4CE3A-8C88-45AA-A849-57E5A7AC22C1}"/>
               </a:ext>
             </a:extLst>
           </p:cNvPr>
@@ -6467,10 +6292,10 @@
           <p:cNvPr id="11" name="Rectangle 10">
             <a:extLst>
               <a:ext uri="{FF2B5EF4-FFF2-40B4-BE49-F238E27FC236}">
-                <a16:creationId xmlns:a16="http://schemas.microsoft.com/office/drawing/2014/main" id="{5F253864-26FA-4AB1-9F0A-4F57D870EE85}"/>
+                <a16:creationId xmlns:a16="http://schemas.microsoft.com/office/drawing/2014/main" xmlns="" id="{5F253864-26FA-4AB1-9F0A-4F57D870EE85}"/>
               </a:ext>
               <a:ext uri="{C183D7F6-B498-43B3-948B-1728B52AA6E4}">
-                <adec:decorative xmlns="" xmlns:adec="http://schemas.microsoft.com/office/drawing/2017/decorative" val="1"/>
+                <adec:decorative xmlns:adec="http://schemas.microsoft.com/office/drawing/2017/decorative" xmlns="" val="1"/>
               </a:ext>
             </a:extLst>
           </p:cNvPr>
@@ -6532,7 +6357,7 @@
           <a:blip r:embed="rId2" cstate="print">
             <a:extLst>
               <a:ext uri="{28A0092B-C50C-407E-A947-70E740481C1C}">
-                <a14:useLocalDpi xmlns:a14="http://schemas.microsoft.com/office/drawing/2010/main" val="0"/>
+                <a14:useLocalDpi xmlns:a14="http://schemas.microsoft.com/office/drawing/2010/main" xmlns="" val="0"/>
               </a:ext>
             </a:extLst>
           </a:blip>
@@ -6553,7 +6378,7 @@
     </p:spTree>
     <p:extLst>
       <p:ext uri="{BB962C8B-B14F-4D97-AF65-F5344CB8AC3E}">
-        <p14:creationId xmlns:p14="http://schemas.microsoft.com/office/powerpoint/2010/main" val="1281103274"/>
+        <p14:creationId xmlns:p14="http://schemas.microsoft.com/office/powerpoint/2010/main" xmlns="" val="1281103274"/>
       </p:ext>
     </p:extLst>
   </p:cSld>
@@ -6592,7 +6417,7 @@
           <p:cNvPr id="2" name="Title 1">
             <a:extLst>
               <a:ext uri="{FF2B5EF4-FFF2-40B4-BE49-F238E27FC236}">
-                <a16:creationId xmlns:a16="http://schemas.microsoft.com/office/drawing/2014/main" id="{E199600F-A17E-4354-A7AB-0CC2A43A9354}"/>
+                <a16:creationId xmlns:a16="http://schemas.microsoft.com/office/drawing/2014/main" xmlns="" id="{E199600F-A17E-4354-A7AB-0CC2A43A9354}"/>
               </a:ext>
             </a:extLst>
           </p:cNvPr>
@@ -6630,7 +6455,7 @@
           <p:cNvPr id="3" name="Content Placeholder 2">
             <a:extLst>
               <a:ext uri="{FF2B5EF4-FFF2-40B4-BE49-F238E27FC236}">
-                <a16:creationId xmlns:a16="http://schemas.microsoft.com/office/drawing/2014/main" id="{FA6A4B49-27C8-46B6-8B11-AD7E8F615E2C}"/>
+                <a16:creationId xmlns:a16="http://schemas.microsoft.com/office/drawing/2014/main" xmlns="" id="{FA6A4B49-27C8-46B6-8B11-AD7E8F615E2C}"/>
               </a:ext>
             </a:extLst>
           </p:cNvPr>
@@ -6704,7 +6529,7 @@
           <p:cNvPr id="4" name="Slide Number Placeholder 3">
             <a:extLst>
               <a:ext uri="{FF2B5EF4-FFF2-40B4-BE49-F238E27FC236}">
-                <a16:creationId xmlns:a16="http://schemas.microsoft.com/office/drawing/2014/main" id="{62B4CE3A-8C88-45AA-A849-57E5A7AC22C1}"/>
+                <a16:creationId xmlns:a16="http://schemas.microsoft.com/office/drawing/2014/main" xmlns="" id="{62B4CE3A-8C88-45AA-A849-57E5A7AC22C1}"/>
               </a:ext>
             </a:extLst>
           </p:cNvPr>
@@ -6743,10 +6568,10 @@
           <p:cNvPr id="11" name="Rectangle 10">
             <a:extLst>
               <a:ext uri="{FF2B5EF4-FFF2-40B4-BE49-F238E27FC236}">
-                <a16:creationId xmlns:a16="http://schemas.microsoft.com/office/drawing/2014/main" id="{5F253864-26FA-4AB1-9F0A-4F57D870EE85}"/>
+                <a16:creationId xmlns:a16="http://schemas.microsoft.com/office/drawing/2014/main" xmlns="" id="{5F253864-26FA-4AB1-9F0A-4F57D870EE85}"/>
               </a:ext>
               <a:ext uri="{C183D7F6-B498-43B3-948B-1728B52AA6E4}">
-                <adec:decorative xmlns="" xmlns:adec="http://schemas.microsoft.com/office/drawing/2017/decorative" val="1"/>
+                <adec:decorative xmlns:adec="http://schemas.microsoft.com/office/drawing/2017/decorative" xmlns="" val="1"/>
               </a:ext>
             </a:extLst>
           </p:cNvPr>
@@ -6799,7 +6624,7 @@
     </p:spTree>
     <p:extLst>
       <p:ext uri="{BB962C8B-B14F-4D97-AF65-F5344CB8AC3E}">
-        <p14:creationId xmlns:p14="http://schemas.microsoft.com/office/powerpoint/2010/main" val="3666108874"/>
+        <p14:creationId xmlns:p14="http://schemas.microsoft.com/office/powerpoint/2010/main" xmlns="" val="3666108874"/>
       </p:ext>
     </p:extLst>
   </p:cSld>
@@ -6838,7 +6663,7 @@
           <p:cNvPr id="2" name="Title 1">
             <a:extLst>
               <a:ext uri="{FF2B5EF4-FFF2-40B4-BE49-F238E27FC236}">
-                <a16:creationId xmlns:a16="http://schemas.microsoft.com/office/drawing/2014/main" id="{E199600F-A17E-4354-A7AB-0CC2A43A9354}"/>
+                <a16:creationId xmlns:a16="http://schemas.microsoft.com/office/drawing/2014/main" xmlns="" id="{E199600F-A17E-4354-A7AB-0CC2A43A9354}"/>
               </a:ext>
             </a:extLst>
           </p:cNvPr>
@@ -6873,7 +6698,7 @@
           <p:cNvPr id="3" name="Content Placeholder 2">
             <a:extLst>
               <a:ext uri="{FF2B5EF4-FFF2-40B4-BE49-F238E27FC236}">
-                <a16:creationId xmlns:a16="http://schemas.microsoft.com/office/drawing/2014/main" id="{FA6A4B49-27C8-46B6-8B11-AD7E8F615E2C}"/>
+                <a16:creationId xmlns:a16="http://schemas.microsoft.com/office/drawing/2014/main" xmlns="" id="{FA6A4B49-27C8-46B6-8B11-AD7E8F615E2C}"/>
               </a:ext>
             </a:extLst>
           </p:cNvPr>
@@ -6912,20 +6737,73 @@
             </a:r>
             <a:r>
               <a:rPr lang="en-US" sz="2800" dirty="0" smtClean="0"/>
-              <a:t> is referred to as numeric promotion.</a:t>
-            </a:r>
-          </a:p>
-          <a:p>
+              <a:t> is referred to as </a:t>
+            </a:r>
+            <a:r>
+              <a:rPr lang="en-US" sz="2800" b="1" i="1" dirty="0" smtClean="0">
+                <a:solidFill>
+                  <a:srgbClr val="FFFF00"/>
+                </a:solidFill>
+              </a:rPr>
+              <a:t>numeric promotion</a:t>
+            </a:r>
             <a:r>
               <a:rPr lang="en-US" sz="2800" dirty="0" smtClean="0"/>
-              <a:t>While returning from a method that declares primitives as the return type, boxing/unboxing rules automatically apply.</a:t>
+              <a:t>.</a:t>
             </a:r>
           </a:p>
           <a:p>
             <a:r>
               <a:rPr lang="en-US" sz="2800" dirty="0" smtClean="0"/>
-              <a:t>If a method declares class type as a return type then it can return an object of that class or its subclass.</a:t>
-            </a:r>
+              <a:t>While returning from a method that declares primitives as the return type, </a:t>
+            </a:r>
+            <a:r>
+              <a:rPr lang="en-US" sz="2800" b="1" i="1" dirty="0" smtClean="0">
+                <a:solidFill>
+                  <a:srgbClr val="FFFF00"/>
+                </a:solidFill>
+              </a:rPr>
+              <a:t>boxing/unboxing</a:t>
+            </a:r>
+            <a:r>
+              <a:rPr lang="en-US" sz="2800" dirty="0" smtClean="0"/>
+              <a:t> rules automatically apply.</a:t>
+            </a:r>
+          </a:p>
+          <a:p>
+            <a:r>
+              <a:rPr lang="en-US" sz="2800" dirty="0" smtClean="0"/>
+              <a:t>If a method declares class type as a return type then it can return an object of that class or its subclass</a:t>
+            </a:r>
+            <a:r>
+              <a:rPr lang="en-US" sz="2800" dirty="0" smtClean="0"/>
+              <a:t>.</a:t>
+            </a:r>
+            <a:r>
+              <a:rPr lang="en-IN" sz="2800" dirty="0" smtClean="0"/>
+              <a:t> This is called </a:t>
+            </a:r>
+            <a:r>
+              <a:rPr lang="en-IN" sz="2800" b="1" i="1" dirty="0" smtClean="0">
+                <a:solidFill>
+                  <a:srgbClr val="FFFF00"/>
+                </a:solidFill>
+              </a:rPr>
+              <a:t>covariant </a:t>
+            </a:r>
+            <a:r>
+              <a:rPr lang="en-IN" sz="2800" b="1" i="1" dirty="0" smtClean="0">
+                <a:solidFill>
+                  <a:srgbClr val="FFFF00"/>
+                </a:solidFill>
+              </a:rPr>
+              <a:t>return types</a:t>
+            </a:r>
+            <a:r>
+              <a:rPr lang="en-IN" sz="2800" dirty="0" smtClean="0"/>
+              <a:t>.</a:t>
+            </a:r>
+            <a:endParaRPr lang="en-US" sz="2800" dirty="0" smtClean="0"/>
           </a:p>
           <a:p>
             <a:r>
@@ -6941,7 +6819,7 @@
           <p:cNvPr id="4" name="Slide Number Placeholder 3">
             <a:extLst>
               <a:ext uri="{FF2B5EF4-FFF2-40B4-BE49-F238E27FC236}">
-                <a16:creationId xmlns:a16="http://schemas.microsoft.com/office/drawing/2014/main" id="{62B4CE3A-8C88-45AA-A849-57E5A7AC22C1}"/>
+                <a16:creationId xmlns:a16="http://schemas.microsoft.com/office/drawing/2014/main" xmlns="" id="{62B4CE3A-8C88-45AA-A849-57E5A7AC22C1}"/>
               </a:ext>
             </a:extLst>
           </p:cNvPr>
@@ -6980,10 +6858,10 @@
           <p:cNvPr id="11" name="Rectangle 10">
             <a:extLst>
               <a:ext uri="{FF2B5EF4-FFF2-40B4-BE49-F238E27FC236}">
-                <a16:creationId xmlns:a16="http://schemas.microsoft.com/office/drawing/2014/main" id="{5F253864-26FA-4AB1-9F0A-4F57D870EE85}"/>
+                <a16:creationId xmlns:a16="http://schemas.microsoft.com/office/drawing/2014/main" xmlns="" id="{5F253864-26FA-4AB1-9F0A-4F57D870EE85}"/>
               </a:ext>
               <a:ext uri="{C183D7F6-B498-43B3-948B-1728B52AA6E4}">
-                <adec:decorative xmlns="" xmlns:adec="http://schemas.microsoft.com/office/drawing/2017/decorative" val="1"/>
+                <adec:decorative xmlns:adec="http://schemas.microsoft.com/office/drawing/2017/decorative" xmlns="" val="1"/>
               </a:ext>
             </a:extLst>
           </p:cNvPr>
@@ -7036,7 +6914,7 @@
     </p:spTree>
     <p:extLst>
       <p:ext uri="{BB962C8B-B14F-4D97-AF65-F5344CB8AC3E}">
-        <p14:creationId xmlns:p14="http://schemas.microsoft.com/office/powerpoint/2010/main" val="2745771103"/>
+        <p14:creationId xmlns:p14="http://schemas.microsoft.com/office/powerpoint/2010/main" xmlns="" val="2745771103"/>
       </p:ext>
     </p:extLst>
   </p:cSld>
@@ -7075,7 +6953,7 @@
           <p:cNvPr id="2" name="Title 1">
             <a:extLst>
               <a:ext uri="{FF2B5EF4-FFF2-40B4-BE49-F238E27FC236}">
-                <a16:creationId xmlns:a16="http://schemas.microsoft.com/office/drawing/2014/main" id="{E199600F-A17E-4354-A7AB-0CC2A43A9354}"/>
+                <a16:creationId xmlns:a16="http://schemas.microsoft.com/office/drawing/2014/main" xmlns="" id="{E199600F-A17E-4354-A7AB-0CC2A43A9354}"/>
               </a:ext>
             </a:extLst>
           </p:cNvPr>
@@ -7110,7 +6988,7 @@
           <p:cNvPr id="3" name="Content Placeholder 2">
             <a:extLst>
               <a:ext uri="{FF2B5EF4-FFF2-40B4-BE49-F238E27FC236}">
-                <a16:creationId xmlns:a16="http://schemas.microsoft.com/office/drawing/2014/main" id="{FA6A4B49-27C8-46B6-8B11-AD7E8F615E2C}"/>
+                <a16:creationId xmlns:a16="http://schemas.microsoft.com/office/drawing/2014/main" xmlns="" id="{FA6A4B49-27C8-46B6-8B11-AD7E8F615E2C}"/>
               </a:ext>
             </a:extLst>
           </p:cNvPr>
@@ -7166,7 +7044,7 @@
           <p:cNvPr id="4" name="Slide Number Placeholder 3">
             <a:extLst>
               <a:ext uri="{FF2B5EF4-FFF2-40B4-BE49-F238E27FC236}">
-                <a16:creationId xmlns:a16="http://schemas.microsoft.com/office/drawing/2014/main" id="{62B4CE3A-8C88-45AA-A849-57E5A7AC22C1}"/>
+                <a16:creationId xmlns:a16="http://schemas.microsoft.com/office/drawing/2014/main" xmlns="" id="{62B4CE3A-8C88-45AA-A849-57E5A7AC22C1}"/>
               </a:ext>
             </a:extLst>
           </p:cNvPr>
@@ -7205,10 +7083,10 @@
           <p:cNvPr id="11" name="Rectangle 10">
             <a:extLst>
               <a:ext uri="{FF2B5EF4-FFF2-40B4-BE49-F238E27FC236}">
-                <a16:creationId xmlns:a16="http://schemas.microsoft.com/office/drawing/2014/main" id="{5F253864-26FA-4AB1-9F0A-4F57D870EE85}"/>
+                <a16:creationId xmlns:a16="http://schemas.microsoft.com/office/drawing/2014/main" xmlns="" id="{5F253864-26FA-4AB1-9F0A-4F57D870EE85}"/>
               </a:ext>
               <a:ext uri="{C183D7F6-B498-43B3-948B-1728B52AA6E4}">
-                <adec:decorative xmlns="" xmlns:adec="http://schemas.microsoft.com/office/drawing/2017/decorative" val="1"/>
+                <adec:decorative xmlns:adec="http://schemas.microsoft.com/office/drawing/2017/decorative" xmlns="" val="1"/>
               </a:ext>
             </a:extLst>
           </p:cNvPr>
@@ -7261,7 +7139,7 @@
     </p:spTree>
     <p:extLst>
       <p:ext uri="{BB962C8B-B14F-4D97-AF65-F5344CB8AC3E}">
-        <p14:creationId xmlns:p14="http://schemas.microsoft.com/office/powerpoint/2010/main" val="1093716427"/>
+        <p14:creationId xmlns:p14="http://schemas.microsoft.com/office/powerpoint/2010/main" xmlns="" val="1093716427"/>
       </p:ext>
     </p:extLst>
   </p:cSld>
@@ -7300,7 +7178,7 @@
           <p:cNvPr id="2" name="Title 1">
             <a:extLst>
               <a:ext uri="{FF2B5EF4-FFF2-40B4-BE49-F238E27FC236}">
-                <a16:creationId xmlns:a16="http://schemas.microsoft.com/office/drawing/2014/main" id="{E199600F-A17E-4354-A7AB-0CC2A43A9354}"/>
+                <a16:creationId xmlns:a16="http://schemas.microsoft.com/office/drawing/2014/main" xmlns="" id="{E199600F-A17E-4354-A7AB-0CC2A43A9354}"/>
               </a:ext>
             </a:extLst>
           </p:cNvPr>
@@ -7335,7 +7213,7 @@
           <p:cNvPr id="3" name="Content Placeholder 2">
             <a:extLst>
               <a:ext uri="{FF2B5EF4-FFF2-40B4-BE49-F238E27FC236}">
-                <a16:creationId xmlns:a16="http://schemas.microsoft.com/office/drawing/2014/main" id="{FA6A4B49-27C8-46B6-8B11-AD7E8F615E2C}"/>
+                <a16:creationId xmlns:a16="http://schemas.microsoft.com/office/drawing/2014/main" xmlns="" id="{FA6A4B49-27C8-46B6-8B11-AD7E8F615E2C}"/>
               </a:ext>
             </a:extLst>
           </p:cNvPr>
@@ -7430,7 +7308,7 @@
           <p:cNvPr id="4" name="Slide Number Placeholder 3">
             <a:extLst>
               <a:ext uri="{FF2B5EF4-FFF2-40B4-BE49-F238E27FC236}">
-                <a16:creationId xmlns:a16="http://schemas.microsoft.com/office/drawing/2014/main" id="{62B4CE3A-8C88-45AA-A849-57E5A7AC22C1}"/>
+                <a16:creationId xmlns:a16="http://schemas.microsoft.com/office/drawing/2014/main" xmlns="" id="{62B4CE3A-8C88-45AA-A849-57E5A7AC22C1}"/>
               </a:ext>
             </a:extLst>
           </p:cNvPr>
@@ -7469,10 +7347,10 @@
           <p:cNvPr id="11" name="Rectangle 10">
             <a:extLst>
               <a:ext uri="{FF2B5EF4-FFF2-40B4-BE49-F238E27FC236}">
-                <a16:creationId xmlns:a16="http://schemas.microsoft.com/office/drawing/2014/main" id="{5F253864-26FA-4AB1-9F0A-4F57D870EE85}"/>
+                <a16:creationId xmlns:a16="http://schemas.microsoft.com/office/drawing/2014/main" xmlns="" id="{5F253864-26FA-4AB1-9F0A-4F57D870EE85}"/>
               </a:ext>
               <a:ext uri="{C183D7F6-B498-43B3-948B-1728B52AA6E4}">
-                <adec:decorative xmlns="" xmlns:adec="http://schemas.microsoft.com/office/drawing/2017/decorative" val="1"/>
+                <adec:decorative xmlns:adec="http://schemas.microsoft.com/office/drawing/2017/decorative" xmlns="" val="1"/>
               </a:ext>
             </a:extLst>
           </p:cNvPr>
@@ -7525,7 +7403,7 @@
     </p:spTree>
     <p:extLst>
       <p:ext uri="{BB962C8B-B14F-4D97-AF65-F5344CB8AC3E}">
-        <p14:creationId xmlns:p14="http://schemas.microsoft.com/office/powerpoint/2010/main" val="1886034423"/>
+        <p14:creationId xmlns:p14="http://schemas.microsoft.com/office/powerpoint/2010/main" xmlns="" val="1886034423"/>
       </p:ext>
     </p:extLst>
   </p:cSld>
@@ -7564,7 +7442,7 @@
           <p:cNvPr id="2" name="Title 1">
             <a:extLst>
               <a:ext uri="{FF2B5EF4-FFF2-40B4-BE49-F238E27FC236}">
-                <a16:creationId xmlns:a16="http://schemas.microsoft.com/office/drawing/2014/main" id="{E199600F-A17E-4354-A7AB-0CC2A43A9354}"/>
+                <a16:creationId xmlns:a16="http://schemas.microsoft.com/office/drawing/2014/main" xmlns="" id="{E199600F-A17E-4354-A7AB-0CC2A43A9354}"/>
               </a:ext>
             </a:extLst>
           </p:cNvPr>
@@ -7633,7 +7511,39 @@
           <a:p>
             <a:r>
               <a:rPr lang="en-US" sz="2400" dirty="0" smtClean="0"/>
-              <a:t>In Java there are two types of polymorphism ,one is compile time and the other is runtime polymorphism. In this chapter we shall be limiting ourselves to compile time polymorphism.</a:t>
+              <a:t>In Java there are two types of polymorphism ,one is </a:t>
+            </a:r>
+            <a:r>
+              <a:rPr lang="en-US" sz="2400" b="1" i="1" dirty="0" smtClean="0">
+                <a:solidFill>
+                  <a:srgbClr val="FFFF00"/>
+                </a:solidFill>
+              </a:rPr>
+              <a:t>compile </a:t>
+            </a:r>
+            <a:r>
+              <a:rPr lang="en-US" sz="2400" b="1" i="1" dirty="0" smtClean="0">
+                <a:solidFill>
+                  <a:srgbClr val="FFFF00"/>
+                </a:solidFill>
+              </a:rPr>
+              <a:t>time polymorphism </a:t>
+            </a:r>
+            <a:r>
+              <a:rPr lang="en-US" sz="2400" dirty="0" smtClean="0"/>
+              <a:t>and the other is </a:t>
+            </a:r>
+            <a:r>
+              <a:rPr lang="en-US" sz="2400" b="1" i="1" dirty="0" smtClean="0">
+                <a:solidFill>
+                  <a:srgbClr val="FFFF00"/>
+                </a:solidFill>
+              </a:rPr>
+              <a:t>runtime polymorphism</a:t>
+            </a:r>
+            <a:r>
+              <a:rPr lang="en-US" sz="2400" dirty="0" smtClean="0"/>
+              <a:t>. In this chapter we shall be limiting ourselves to compile time polymorphism.</a:t>
             </a:r>
           </a:p>
           <a:p>
@@ -7649,7 +7559,7 @@
           <p:cNvPr id="4" name="Slide Number Placeholder 3">
             <a:extLst>
               <a:ext uri="{FF2B5EF4-FFF2-40B4-BE49-F238E27FC236}">
-                <a16:creationId xmlns:a16="http://schemas.microsoft.com/office/drawing/2014/main" id="{62B4CE3A-8C88-45AA-A849-57E5A7AC22C1}"/>
+                <a16:creationId xmlns:a16="http://schemas.microsoft.com/office/drawing/2014/main" xmlns="" id="{62B4CE3A-8C88-45AA-A849-57E5A7AC22C1}"/>
               </a:ext>
             </a:extLst>
           </p:cNvPr>
@@ -7683,10 +7593,10 @@
           <p:cNvPr id="11" name="Rectangle 10">
             <a:extLst>
               <a:ext uri="{FF2B5EF4-FFF2-40B4-BE49-F238E27FC236}">
-                <a16:creationId xmlns:a16="http://schemas.microsoft.com/office/drawing/2014/main" id="{5F253864-26FA-4AB1-9F0A-4F57D870EE85}"/>
+                <a16:creationId xmlns:a16="http://schemas.microsoft.com/office/drawing/2014/main" xmlns="" id="{5F253864-26FA-4AB1-9F0A-4F57D870EE85}"/>
               </a:ext>
               <a:ext uri="{C183D7F6-B498-43B3-948B-1728B52AA6E4}">
-                <adec:decorative xmlns="" xmlns:adec="http://schemas.microsoft.com/office/drawing/2017/decorative" val="1"/>
+                <adec:decorative xmlns:adec="http://schemas.microsoft.com/office/drawing/2017/decorative" xmlns="" val="1"/>
               </a:ext>
             </a:extLst>
           </p:cNvPr>
@@ -7739,7 +7649,7 @@
     </p:spTree>
     <p:extLst>
       <p:ext uri="{BB962C8B-B14F-4D97-AF65-F5344CB8AC3E}">
-        <p14:creationId xmlns:p14="http://schemas.microsoft.com/office/powerpoint/2010/main" val="1287735390"/>
+        <p14:creationId xmlns:p14="http://schemas.microsoft.com/office/powerpoint/2010/main" xmlns="" val="1287735390"/>
       </p:ext>
     </p:extLst>
   </p:cSld>
@@ -7778,7 +7688,7 @@
           <p:cNvPr id="2" name="Title 1">
             <a:extLst>
               <a:ext uri="{FF2B5EF4-FFF2-40B4-BE49-F238E27FC236}">
-                <a16:creationId xmlns:a16="http://schemas.microsoft.com/office/drawing/2014/main" id="{E199600F-A17E-4354-A7AB-0CC2A43A9354}"/>
+                <a16:creationId xmlns:a16="http://schemas.microsoft.com/office/drawing/2014/main" xmlns="" id="{E199600F-A17E-4354-A7AB-0CC2A43A9354}"/>
               </a:ext>
             </a:extLst>
           </p:cNvPr>
@@ -7792,7 +7702,7 @@
         <p:spPr>
           <a:xfrm>
             <a:off x="838200" y="641855"/>
-            <a:ext cx="10515600" cy="772107"/>
+            <a:ext cx="10515600" cy="1326105"/>
           </a:xfrm>
         </p:spPr>
         <p:txBody>
@@ -7801,9 +7711,21 @@
           <a:p>
             <a:pPr algn="ctr"/>
             <a:r>
-              <a:rPr lang="en-US" dirty="0"/>
-              <a:t>Polymorphism :Method Overloading</a:t>
-            </a:r>
+              <a:rPr lang="en-US" dirty="0" smtClean="0"/>
+              <a:t>Compile Time Polymorphism </a:t>
+            </a:r>
+            <a:br>
+              <a:rPr lang="en-US" dirty="0" smtClean="0"/>
+            </a:br>
+            <a:r>
+              <a:rPr smtClean="0"/>
+              <a:t>(</a:t>
+            </a:r>
+            <a:r>
+              <a:rPr lang="en-US" dirty="0" smtClean="0"/>
+              <a:t>Method Overloading)</a:t>
+            </a:r>
+            <a:endParaRPr lang="en-US" dirty="0"/>
           </a:p>
         </p:txBody>
       </p:sp>
@@ -7819,7 +7741,7 @@
         </p:nvSpPr>
         <p:spPr>
           <a:xfrm>
-            <a:off x="682625" y="2010137"/>
+            <a:off x="682625" y="2075452"/>
             <a:ext cx="10515600" cy="4351338"/>
           </a:xfrm>
         </p:spPr>
@@ -7873,7 +7795,7 @@
           <p:cNvPr id="4" name="Slide Number Placeholder 3">
             <a:extLst>
               <a:ext uri="{FF2B5EF4-FFF2-40B4-BE49-F238E27FC236}">
-                <a16:creationId xmlns:a16="http://schemas.microsoft.com/office/drawing/2014/main" id="{62B4CE3A-8C88-45AA-A849-57E5A7AC22C1}"/>
+                <a16:creationId xmlns:a16="http://schemas.microsoft.com/office/drawing/2014/main" xmlns="" id="{62B4CE3A-8C88-45AA-A849-57E5A7AC22C1}"/>
               </a:ext>
             </a:extLst>
           </p:cNvPr>
@@ -7907,10 +7829,10 @@
           <p:cNvPr id="11" name="Rectangle 10">
             <a:extLst>
               <a:ext uri="{FF2B5EF4-FFF2-40B4-BE49-F238E27FC236}">
-                <a16:creationId xmlns:a16="http://schemas.microsoft.com/office/drawing/2014/main" id="{5F253864-26FA-4AB1-9F0A-4F57D870EE85}"/>
+                <a16:creationId xmlns:a16="http://schemas.microsoft.com/office/drawing/2014/main" xmlns="" id="{5F253864-26FA-4AB1-9F0A-4F57D870EE85}"/>
               </a:ext>
               <a:ext uri="{C183D7F6-B498-43B3-948B-1728B52AA6E4}">
-                <adec:decorative xmlns="" xmlns:adec="http://schemas.microsoft.com/office/drawing/2017/decorative" val="1"/>
+                <adec:decorative xmlns:adec="http://schemas.microsoft.com/office/drawing/2017/decorative" xmlns="" val="1"/>
               </a:ext>
             </a:extLst>
           </p:cNvPr>
@@ -7963,7 +7885,7 @@
     </p:spTree>
     <p:extLst>
       <p:ext uri="{BB962C8B-B14F-4D97-AF65-F5344CB8AC3E}">
-        <p14:creationId xmlns:p14="http://schemas.microsoft.com/office/powerpoint/2010/main" val="1023982374"/>
+        <p14:creationId xmlns:p14="http://schemas.microsoft.com/office/powerpoint/2010/main" xmlns="" val="1023982374"/>
       </p:ext>
     </p:extLst>
   </p:cSld>
@@ -8002,7 +7924,7 @@
           <p:cNvPr id="2" name="Title 1">
             <a:extLst>
               <a:ext uri="{FF2B5EF4-FFF2-40B4-BE49-F238E27FC236}">
-                <a16:creationId xmlns:a16="http://schemas.microsoft.com/office/drawing/2014/main" id="{E199600F-A17E-4354-A7AB-0CC2A43A9354}"/>
+                <a16:creationId xmlns:a16="http://schemas.microsoft.com/office/drawing/2014/main" xmlns="" id="{E199600F-A17E-4354-A7AB-0CC2A43A9354}"/>
               </a:ext>
             </a:extLst>
           </p:cNvPr>
@@ -8068,8 +7990,16 @@
           <a:p>
             <a:pPr lvl="1"/>
             <a:r>
+              <a:rPr lang="en-US" sz="2200" b="1" dirty="0" smtClean="0">
+                <a:solidFill>
+                  <a:srgbClr val="FFFF00"/>
+                </a:solidFill>
+              </a:rPr>
+              <a:t>Exact match </a:t>
+            </a:r>
+            <a:r>
               <a:rPr lang="en-US" sz="2200" dirty="0" smtClean="0"/>
-              <a:t>Exact match : </a:t>
+              <a:t>: </a:t>
             </a:r>
             <a:r>
               <a:rPr lang="en-US" sz="2400" dirty="0" smtClean="0"/>
@@ -8106,8 +8036,16 @@
           <a:p>
             <a:pPr lvl="1"/>
             <a:r>
+              <a:rPr lang="en-US" sz="2200" b="1" dirty="0" smtClean="0">
+                <a:solidFill>
+                  <a:srgbClr val="FFFF00"/>
+                </a:solidFill>
+              </a:rPr>
+              <a:t>Specificity</a:t>
+            </a:r>
+            <a:r>
               <a:rPr lang="en-US" sz="2200" dirty="0" smtClean="0"/>
-              <a:t>Specificity : Nearest matching parameters in terms of inheritance hierarchy.</a:t>
+              <a:t> : Nearest matching parameters in terms of inheritance hierarchy.</a:t>
             </a:r>
           </a:p>
           <a:p>
@@ -8117,12 +8055,12 @@
               <a:t>If no methods as per the exact match rule fit then a method which has nearest </a:t>
             </a:r>
             <a:r>
-              <a:rPr lang="en-US" sz="2000" dirty="0" err="1" smtClean="0"/>
-              <a:t>matach</a:t>
-            </a:r>
-            <a:r>
               <a:rPr lang="en-US" sz="2000" dirty="0" smtClean="0"/>
-              <a:t> parameters as per the inheritance hierarchy is matched.</a:t>
+              <a:t>match </a:t>
+            </a:r>
+            <a:r>
+              <a:rPr lang="en-US" sz="2000" dirty="0" smtClean="0"/>
+              <a:t>parameters as per the inheritance hierarchy is matched.</a:t>
             </a:r>
           </a:p>
           <a:p>
@@ -8165,14 +8103,26 @@
           <a:p>
             <a:pPr lvl="1"/>
             <a:r>
-              <a:rPr lang="en-US" sz="2200" dirty="0" smtClean="0"/>
+              <a:rPr lang="en-US" sz="2200" b="1" dirty="0" smtClean="0">
+                <a:solidFill>
+                  <a:srgbClr val="FFFF00"/>
+                </a:solidFill>
+              </a:rPr>
               <a:t>Widening before </a:t>
             </a:r>
             <a:r>
-              <a:rPr lang="en-US" sz="2200" dirty="0" err="1" smtClean="0"/>
+              <a:rPr lang="en-US" sz="2200" b="1" dirty="0" err="1" smtClean="0">
+                <a:solidFill>
+                  <a:srgbClr val="FFFF00"/>
+                </a:solidFill>
+              </a:rPr>
               <a:t>Autoboxing</a:t>
             </a:r>
-            <a:endParaRPr lang="en-US" sz="2200" dirty="0"/>
+            <a:endParaRPr lang="en-US" sz="2200" b="1" dirty="0">
+              <a:solidFill>
+                <a:srgbClr val="FFFF00"/>
+              </a:solidFill>
+            </a:endParaRPr>
           </a:p>
           <a:p>
             <a:pPr lvl="2"/>
@@ -8200,7 +8150,7 @@
           <p:cNvPr id="4" name="Slide Number Placeholder 3">
             <a:extLst>
               <a:ext uri="{FF2B5EF4-FFF2-40B4-BE49-F238E27FC236}">
-                <a16:creationId xmlns:a16="http://schemas.microsoft.com/office/drawing/2014/main" id="{62B4CE3A-8C88-45AA-A849-57E5A7AC22C1}"/>
+                <a16:creationId xmlns:a16="http://schemas.microsoft.com/office/drawing/2014/main" xmlns="" id="{62B4CE3A-8C88-45AA-A849-57E5A7AC22C1}"/>
               </a:ext>
             </a:extLst>
           </p:cNvPr>
@@ -8234,10 +8184,10 @@
           <p:cNvPr id="11" name="Rectangle 10">
             <a:extLst>
               <a:ext uri="{FF2B5EF4-FFF2-40B4-BE49-F238E27FC236}">
-                <a16:creationId xmlns:a16="http://schemas.microsoft.com/office/drawing/2014/main" id="{5F253864-26FA-4AB1-9F0A-4F57D870EE85}"/>
+                <a16:creationId xmlns:a16="http://schemas.microsoft.com/office/drawing/2014/main" xmlns="" id="{5F253864-26FA-4AB1-9F0A-4F57D870EE85}"/>
               </a:ext>
               <a:ext uri="{C183D7F6-B498-43B3-948B-1728B52AA6E4}">
-                <adec:decorative xmlns="" xmlns:adec="http://schemas.microsoft.com/office/drawing/2017/decorative" val="1"/>
+                <adec:decorative xmlns:adec="http://schemas.microsoft.com/office/drawing/2017/decorative" xmlns="" val="1"/>
               </a:ext>
             </a:extLst>
           </p:cNvPr>
@@ -8290,7 +8240,7 @@
     </p:spTree>
     <p:extLst>
       <p:ext uri="{BB962C8B-B14F-4D97-AF65-F5344CB8AC3E}">
-        <p14:creationId xmlns:p14="http://schemas.microsoft.com/office/powerpoint/2010/main" val="1123601731"/>
+        <p14:creationId xmlns:p14="http://schemas.microsoft.com/office/powerpoint/2010/main" xmlns="" val="1123601731"/>
       </p:ext>
     </p:extLst>
   </p:cSld>
@@ -8502,7 +8452,7 @@
   <a:extraClrSchemeLst/>
   <a:extLst>
     <a:ext uri="{05A4C25C-085E-4340-85A3-A5531E510DB2}">
-      <thm15:themeFamily xmlns:thm15="http://schemas.microsoft.com/office/thememl/2012/main" name="Classic-Corporate_Teach a Course_Win32_SB - v2" id="{AAA48AC2-5F99-4B13-8624-B64D50F70391}" vid="{7E93EDBA-CDC2-40D2-AD59-7619D791F782}"/>
+      <thm15:themeFamily xmlns:thm15="http://schemas.microsoft.com/office/thememl/2012/main" xmlns="" name="Classic-Corporate_Teach a Course_Win32_SB - v2" id="{AAA48AC2-5F99-4B13-8624-B64D50F70391}" vid="{7E93EDBA-CDC2-40D2-AD59-7619D791F782}"/>
     </a:ext>
   </a:extLst>
 </a:theme>
@@ -8551,7 +8501,7 @@
     </a:clrScheme>
     <a:fontScheme name="Office">
       <a:majorFont>
-        <a:latin typeface="Calibri Light" panose="020F0302020204030204"/>
+        <a:latin typeface="Calibri Light"/>
         <a:ea typeface=""/>
         <a:cs typeface=""/>
         <a:font script="Jpan" typeface="游ゴシック Light"/>
@@ -8603,7 +8553,7 @@
         <a:font script="Tfng" typeface="Ebrima"/>
       </a:majorFont>
       <a:minorFont>
-        <a:latin typeface="Calibri" panose="020F0502020204030204"/>
+        <a:latin typeface="Calibri"/>
         <a:ea typeface=""/>
         <a:cs typeface=""/>
         <a:font script="Jpan" typeface="游ゴシック"/>
@@ -8797,7 +8747,7 @@
   <a:extraClrSchemeLst/>
   <a:extLst>
     <a:ext uri="{05A4C25C-085E-4340-85A3-A5531E510DB2}">
-      <thm15:themeFamily xmlns:thm15="http://schemas.microsoft.com/office/thememl/2012/main" name="Office Theme" id="{62F939B6-93AF-4DB8-9C6B-D6C7DFDC589F}" vid="{4A3C46E8-61CC-4603-A589-7422A47A8E4A}"/>
+      <thm15:themeFamily xmlns:thm15="http://schemas.microsoft.com/office/thememl/2012/main" xmlns="" name="Office Theme" id="{62F939B6-93AF-4DB8-9C6B-D6C7DFDC589F}" vid="{4A3C46E8-61CC-4603-A589-7422A47A8E4A}"/>
     </a:ext>
   </a:extLst>
 </a:theme>
@@ -8846,7 +8796,7 @@
     </a:clrScheme>
     <a:fontScheme name="Office">
       <a:majorFont>
-        <a:latin typeface="Calibri Light" panose="020F0302020204030204"/>
+        <a:latin typeface="Calibri Light"/>
         <a:ea typeface=""/>
         <a:cs typeface=""/>
         <a:font script="Jpan" typeface="游ゴシック Light"/>
@@ -8898,7 +8848,7 @@
         <a:font script="Tfng" typeface="Ebrima"/>
       </a:majorFont>
       <a:minorFont>
-        <a:latin typeface="Calibri" panose="020F0502020204030204"/>
+        <a:latin typeface="Calibri"/>
         <a:ea typeface=""/>
         <a:cs typeface=""/>
         <a:font script="Jpan" typeface="游ゴシック"/>
@@ -9092,7 +9042,7 @@
   <a:extraClrSchemeLst/>
   <a:extLst>
     <a:ext uri="{05A4C25C-085E-4340-85A3-A5531E510DB2}">
-      <thm15:themeFamily xmlns:thm15="http://schemas.microsoft.com/office/thememl/2012/main" name="Office Theme" id="{62F939B6-93AF-4DB8-9C6B-D6C7DFDC589F}" vid="{4A3C46E8-61CC-4603-A589-7422A47A8E4A}"/>
+      <thm15:themeFamily xmlns:thm15="http://schemas.microsoft.com/office/thememl/2012/main" xmlns="" name="Office Theme" id="{62F939B6-93AF-4DB8-9C6B-D6C7DFDC589F}" vid="{4A3C46E8-61CC-4603-A589-7422A47A8E4A}"/>
     </a:ext>
   </a:extLst>
 </a:theme>
@@ -9185,12 +9135,12 @@
 </file>
 
 <file path=customXml/item1.xml><?xml version="1.0" encoding="utf-8"?>
-<p:properties xmlns:p="http://schemas.microsoft.com/office/2006/metadata/properties" xmlns:xsi="http://www.w3.org/2001/XMLSchema-instance" xmlns:pc="http://schemas.microsoft.com/office/infopath/2007/PartnerControls">
-  <documentManagement>
-    <Status xmlns="71af3243-3dd4-4a8d-8c0d-dd76da1f02a5">Not started</Status>
-    <MediaServiceKeyPoints xmlns="71af3243-3dd4-4a8d-8c0d-dd76da1f02a5" xsi:nil="true"/>
-  </documentManagement>
-</p:properties>
+<?mso-contentType ?>
+<FormTemplates xmlns="http://schemas.microsoft.com/sharepoint/v3/contenttype/forms">
+  <Display>DocumentLibraryForm</Display>
+  <Edit>DocumentLibraryForm</Edit>
+  <New>DocumentLibraryForm</New>
+</FormTemplates>
 </file>
 
 <file path=customXml/item2.xml><?xml version="1.0" encoding="utf-8"?>
@@ -9415,20 +9365,18 @@
 </file>
 
 <file path=customXml/item3.xml><?xml version="1.0" encoding="utf-8"?>
-<?mso-contentType ?>
-<FormTemplates xmlns="http://schemas.microsoft.com/sharepoint/v3/contenttype/forms">
-  <Display>DocumentLibraryForm</Display>
-  <Edit>DocumentLibraryForm</Edit>
-  <New>DocumentLibraryForm</New>
-</FormTemplates>
+<p:properties xmlns:p="http://schemas.microsoft.com/office/2006/metadata/properties" xmlns:xsi="http://www.w3.org/2001/XMLSchema-instance" xmlns:pc="http://schemas.microsoft.com/office/infopath/2007/PartnerControls">
+  <documentManagement>
+    <Status xmlns="71af3243-3dd4-4a8d-8c0d-dd76da1f02a5">Not started</Status>
+    <MediaServiceKeyPoints xmlns="71af3243-3dd4-4a8d-8c0d-dd76da1f02a5" xsi:nil="true"/>
+  </documentManagement>
+</p:properties>
 </file>
 
 <file path=customXml/itemProps1.xml><?xml version="1.0" encoding="utf-8"?>
-<ds:datastoreItem xmlns:ds="http://schemas.openxmlformats.org/officeDocument/2006/customXml" ds:itemID="{F4E32C0B-4052-44CB-9341-8AD8B2CC4712}">
+<ds:datastoreItem xmlns:ds="http://schemas.openxmlformats.org/officeDocument/2006/customXml" ds:itemID="{EBB7C387-AFDC-4FE3-A658-984B7F35F155}">
   <ds:schemaRefs>
-    <ds:schemaRef ds:uri="http://schemas.microsoft.com/office/2006/metadata/properties"/>
-    <ds:schemaRef ds:uri="http://schemas.microsoft.com/office/infopath/2007/PartnerControls"/>
-    <ds:schemaRef ds:uri="71af3243-3dd4-4a8d-8c0d-dd76da1f02a5"/>
+    <ds:schemaRef ds:uri="http://schemas.microsoft.com/sharepoint/v3/contenttype/forms"/>
   </ds:schemaRefs>
 </ds:datastoreItem>
 </file>
@@ -9453,9 +9401,11 @@
 </file>
 
 <file path=customXml/itemProps3.xml><?xml version="1.0" encoding="utf-8"?>
-<ds:datastoreItem xmlns:ds="http://schemas.openxmlformats.org/officeDocument/2006/customXml" ds:itemID="{EBB7C387-AFDC-4FE3-A658-984B7F35F155}">
+<ds:datastoreItem xmlns:ds="http://schemas.openxmlformats.org/officeDocument/2006/customXml" ds:itemID="{F4E32C0B-4052-44CB-9341-8AD8B2CC4712}">
   <ds:schemaRefs>
-    <ds:schemaRef ds:uri="http://schemas.microsoft.com/sharepoint/v3/contenttype/forms"/>
+    <ds:schemaRef ds:uri="http://schemas.microsoft.com/office/2006/metadata/properties"/>
+    <ds:schemaRef ds:uri="http://schemas.microsoft.com/office/infopath/2007/PartnerControls"/>
+    <ds:schemaRef ds:uri="71af3243-3dd4-4a8d-8c0d-dd76da1f02a5"/>
   </ds:schemaRefs>
 </ds:datastoreItem>
 </file>
</xml_diff>